<commit_message>
more clarification in slides
</commit_message>
<xml_diff>
--- a/karma-demo-slides.pptx
+++ b/karma-demo-slides.pptx
@@ -120,7 +120,7 @@
   </p:defaultTextStyle>
   <p:extLst>
     <p:ext uri="{EFAFB233-063F-42B5-8137-9DF3F51BA10A}">
-      <p15:sldGuideLst xmlns="" xmlns:p15="http://schemas.microsoft.com/office/powerpoint/2012/main"/>
+      <p15:sldGuideLst xmlns:p15="http://schemas.microsoft.com/office/powerpoint/2012/main" xmlns=""/>
     </p:ext>
   </p:extLst>
 </p:presentation>
@@ -257,7 +257,7 @@
           <a:p>
             <a:fld id="{EEA2338F-4137-4D41-9621-F1822CC7677A}" type="datetimeFigureOut">
               <a:rPr lang="en-US" smtClean="0"/>
-              <a:t>9/20/2014</a:t>
+              <a:t>9/21/2014</a:t>
             </a:fld>
             <a:endParaRPr lang="en-US"/>
           </a:p>
@@ -427,7 +427,7 @@
           <a:p>
             <a:fld id="{EEA2338F-4137-4D41-9621-F1822CC7677A}" type="datetimeFigureOut">
               <a:rPr lang="en-US" smtClean="0"/>
-              <a:t>9/20/2014</a:t>
+              <a:t>9/21/2014</a:t>
             </a:fld>
             <a:endParaRPr lang="en-US"/>
           </a:p>
@@ -607,7 +607,7 @@
           <a:p>
             <a:fld id="{EEA2338F-4137-4D41-9621-F1822CC7677A}" type="datetimeFigureOut">
               <a:rPr lang="en-US" smtClean="0"/>
-              <a:t>9/20/2014</a:t>
+              <a:t>9/21/2014</a:t>
             </a:fld>
             <a:endParaRPr lang="en-US"/>
           </a:p>
@@ -777,7 +777,7 @@
           <a:p>
             <a:fld id="{EEA2338F-4137-4D41-9621-F1822CC7677A}" type="datetimeFigureOut">
               <a:rPr lang="en-US" smtClean="0"/>
-              <a:t>9/20/2014</a:t>
+              <a:t>9/21/2014</a:t>
             </a:fld>
             <a:endParaRPr lang="en-US"/>
           </a:p>
@@ -1023,7 +1023,7 @@
           <a:p>
             <a:fld id="{EEA2338F-4137-4D41-9621-F1822CC7677A}" type="datetimeFigureOut">
               <a:rPr lang="en-US" smtClean="0"/>
-              <a:t>9/20/2014</a:t>
+              <a:t>9/21/2014</a:t>
             </a:fld>
             <a:endParaRPr lang="en-US"/>
           </a:p>
@@ -1255,7 +1255,7 @@
           <a:p>
             <a:fld id="{EEA2338F-4137-4D41-9621-F1822CC7677A}" type="datetimeFigureOut">
               <a:rPr lang="en-US" smtClean="0"/>
-              <a:t>9/20/2014</a:t>
+              <a:t>9/21/2014</a:t>
             </a:fld>
             <a:endParaRPr lang="en-US"/>
           </a:p>
@@ -1622,7 +1622,7 @@
           <a:p>
             <a:fld id="{EEA2338F-4137-4D41-9621-F1822CC7677A}" type="datetimeFigureOut">
               <a:rPr lang="en-US" smtClean="0"/>
-              <a:t>9/20/2014</a:t>
+              <a:t>9/21/2014</a:t>
             </a:fld>
             <a:endParaRPr lang="en-US"/>
           </a:p>
@@ -1740,7 +1740,7 @@
           <a:p>
             <a:fld id="{EEA2338F-4137-4D41-9621-F1822CC7677A}" type="datetimeFigureOut">
               <a:rPr lang="en-US" smtClean="0"/>
-              <a:t>9/20/2014</a:t>
+              <a:t>9/21/2014</a:t>
             </a:fld>
             <a:endParaRPr lang="en-US"/>
           </a:p>
@@ -1835,7 +1835,7 @@
           <a:p>
             <a:fld id="{EEA2338F-4137-4D41-9621-F1822CC7677A}" type="datetimeFigureOut">
               <a:rPr lang="en-US" smtClean="0"/>
-              <a:t>9/20/2014</a:t>
+              <a:t>9/21/2014</a:t>
             </a:fld>
             <a:endParaRPr lang="en-US"/>
           </a:p>
@@ -2112,7 +2112,7 @@
           <a:p>
             <a:fld id="{EEA2338F-4137-4D41-9621-F1822CC7677A}" type="datetimeFigureOut">
               <a:rPr lang="en-US" smtClean="0"/>
-              <a:t>9/20/2014</a:t>
+              <a:t>9/21/2014</a:t>
             </a:fld>
             <a:endParaRPr lang="en-US"/>
           </a:p>
@@ -2365,7 +2365,7 @@
           <a:p>
             <a:fld id="{EEA2338F-4137-4D41-9621-F1822CC7677A}" type="datetimeFigureOut">
               <a:rPr lang="en-US" smtClean="0"/>
-              <a:t>9/20/2014</a:t>
+              <a:t>9/21/2014</a:t>
             </a:fld>
             <a:endParaRPr lang="en-US"/>
           </a:p>
@@ -2578,7 +2578,7 @@
           <a:p>
             <a:fld id="{EEA2338F-4137-4D41-9621-F1822CC7677A}" type="datetimeFigureOut">
               <a:rPr lang="en-US" smtClean="0"/>
-              <a:t>9/20/2014</a:t>
+              <a:t>9/21/2014</a:t>
             </a:fld>
             <a:endParaRPr lang="en-US"/>
           </a:p>
@@ -3070,6 +3070,13 @@
   <p:clrMapOvr>
     <a:masterClrMapping/>
   </p:clrMapOvr>
+  <p:timing>
+    <p:tnLst>
+      <p:par>
+        <p:cTn id="1" dur="indefinite" restart="never" nodeType="tmRoot"/>
+      </p:par>
+    </p:tnLst>
+  </p:timing>
 </p:sld>
 </file>
 
@@ -3176,6 +3183,13 @@
   <p:clrMapOvr>
     <a:masterClrMapping/>
   </p:clrMapOvr>
+  <p:timing>
+    <p:tnLst>
+      <p:par>
+        <p:cTn id="1" dur="indefinite" restart="never" nodeType="tmRoot"/>
+      </p:par>
+    </p:tnLst>
+  </p:timing>
 </p:sld>
 </file>
 
@@ -3311,6 +3325,13 @@
   <p:clrMapOvr>
     <a:masterClrMapping/>
   </p:clrMapOvr>
+  <p:timing>
+    <p:tnLst>
+      <p:par>
+        <p:cTn id="1" dur="indefinite" restart="never" nodeType="tmRoot"/>
+      </p:par>
+    </p:tnLst>
+  </p:timing>
 </p:sld>
 </file>
 
@@ -3374,6 +3395,9 @@
           <a:bodyPr/>
           <a:lstStyle/>
           <a:p>
+            <a:pPr marL="0" indent="0">
+              <a:buNone/>
+            </a:pPr>
             <a:r>
               <a:rPr lang="en-US" dirty="0">
                 <a:latin typeface="Consolas" panose="020B0609020204030204" pitchFamily="49" charset="0"/>
@@ -3396,6 +3420,9 @@
             </a:endParaRPr>
           </a:p>
           <a:p>
+            <a:pPr marL="0" indent="0">
+              <a:buNone/>
+            </a:pPr>
             <a:r>
               <a:rPr lang="en-US" dirty="0" smtClean="0">
                 <a:latin typeface="Consolas" panose="020B0609020204030204" pitchFamily="49" charset="0"/>
@@ -3439,6 +3466,9 @@
             </a:endParaRPr>
           </a:p>
           <a:p>
+            <a:pPr marL="0" indent="0">
+              <a:buNone/>
+            </a:pPr>
             <a:r>
               <a:rPr lang="en-US" dirty="0" err="1" smtClean="0">
                 <a:latin typeface="Consolas" panose="020B0609020204030204" pitchFamily="49" charset="0"/>
@@ -3451,14 +3481,54 @@
                 <a:latin typeface="Consolas" panose="020B0609020204030204" pitchFamily="49" charset="0"/>
                 <a:cs typeface="Consolas" panose="020B0609020204030204" pitchFamily="49" charset="0"/>
               </a:rPr>
-              <a:t>: { </a:t>
+              <a:t>: { type: ‘text-summary’ //‘html’ </a:t>
             </a:r>
             <a:r>
               <a:rPr lang="en-US" dirty="0" smtClean="0">
                 <a:latin typeface="Consolas" panose="020B0609020204030204" pitchFamily="49" charset="0"/>
                 <a:cs typeface="Consolas" panose="020B0609020204030204" pitchFamily="49" charset="0"/>
               </a:rPr>
-              <a:t>type: ‘text-summary’ //‘html’ }</a:t>
+              <a:t>}</a:t>
+            </a:r>
+          </a:p>
+          <a:p>
+            <a:pPr marL="0" indent="0">
+              <a:buNone/>
+            </a:pPr>
+            <a:endParaRPr lang="en-US" dirty="0">
+              <a:latin typeface="Consolas" panose="020B0609020204030204" pitchFamily="49" charset="0"/>
+              <a:cs typeface="Consolas" panose="020B0609020204030204" pitchFamily="49" charset="0"/>
+            </a:endParaRPr>
+          </a:p>
+          <a:p>
+            <a:r>
+              <a:rPr lang="en-US" dirty="0" smtClean="0">
+                <a:latin typeface="Consolas" panose="020B0609020204030204" pitchFamily="49" charset="0"/>
+                <a:cs typeface="Consolas" panose="020B0609020204030204" pitchFamily="49" charset="0"/>
+              </a:rPr>
+              <a:t>Uses </a:t>
+            </a:r>
+            <a:r>
+              <a:rPr lang="en-US" dirty="0" smtClean="0">
+                <a:latin typeface="Consolas" panose="020B0609020204030204" pitchFamily="49" charset="0"/>
+                <a:cs typeface="Consolas" panose="020B0609020204030204" pitchFamily="49" charset="0"/>
+                <a:hlinkClick r:id="rId2"/>
+              </a:rPr>
+              <a:t>Istanbul</a:t>
+            </a:r>
+            <a:r>
+              <a:rPr lang="en-US" dirty="0">
+                <a:latin typeface="Consolas" panose="020B0609020204030204" pitchFamily="49" charset="0"/>
+                <a:cs typeface="Consolas" panose="020B0609020204030204" pitchFamily="49" charset="0"/>
+              </a:rPr>
+              <a:t> </a:t>
+            </a:r>
+            <a:r>
+              <a:rPr lang="en-US" dirty="0" smtClean="0">
+                <a:latin typeface="Consolas" panose="020B0609020204030204" pitchFamily="49" charset="0"/>
+                <a:cs typeface="Consolas" panose="020B0609020204030204" pitchFamily="49" charset="0"/>
+              </a:rPr>
+              <a:t>to calculate coverage metrics</a:t>
             </a:r>
             <a:endParaRPr lang="en-US" dirty="0" smtClean="0">
               <a:latin typeface="Consolas" panose="020B0609020204030204" pitchFamily="49" charset="0"/>
@@ -3477,6 +3547,13 @@
   <p:clrMapOvr>
     <a:masterClrMapping/>
   </p:clrMapOvr>
+  <p:timing>
+    <p:tnLst>
+      <p:par>
+        <p:cTn id="1" dur="indefinite" restart="never" nodeType="tmRoot"/>
+      </p:par>
+    </p:tnLst>
+  </p:timing>
 </p:sld>
 </file>
 
@@ -3549,25 +3626,16 @@
           <a:p>
             <a:r>
               <a:rPr lang="en-US" sz="3600" dirty="0" smtClean="0"/>
-              <a:t>Integrate with CI (Jenkins, Travis, </a:t>
-            </a:r>
+              <a:t>Integrate with CI (Jenkins, Travis, …)</a:t>
+            </a:r>
+          </a:p>
+          <a:p>
+            <a:endParaRPr lang="en-US" sz="3600" dirty="0" smtClean="0"/>
+          </a:p>
+          <a:p>
             <a:r>
               <a:rPr lang="en-US" sz="3600" dirty="0" smtClean="0"/>
-              <a:t>…)</a:t>
-            </a:r>
-            <a:endParaRPr lang="en-US" sz="3600" dirty="0" smtClean="0"/>
-          </a:p>
-          <a:p>
-            <a:endParaRPr lang="en-US" sz="3600" dirty="0" smtClean="0"/>
-          </a:p>
-          <a:p>
-            <a:r>
-              <a:rPr lang="en-US" sz="3600" dirty="0" smtClean="0"/>
-              <a:t>Will run tests and set correct exit </a:t>
-            </a:r>
-            <a:r>
-              <a:rPr lang="en-US" sz="3600" dirty="0" smtClean="0"/>
-              <a:t>code</a:t>
+              <a:t>Will run tests and set correct exit code</a:t>
             </a:r>
             <a:endParaRPr lang="en-US" sz="3600" dirty="0"/>
           </a:p>
@@ -3583,6 +3651,13 @@
   <p:clrMapOvr>
     <a:masterClrMapping/>
   </p:clrMapOvr>
+  <p:timing>
+    <p:tnLst>
+      <p:par>
+        <p:cTn id="1" dur="indefinite" restart="never" nodeType="tmRoot"/>
+      </p:par>
+    </p:tnLst>
+  </p:timing>
 </p:sld>
 </file>
 
@@ -3688,6 +3763,13 @@
   <p:clrMapOvr>
     <a:masterClrMapping/>
   </p:clrMapOvr>
+  <p:timing>
+    <p:tnLst>
+      <p:par>
+        <p:cTn id="1" dur="indefinite" restart="never" nodeType="tmRoot"/>
+      </p:par>
+    </p:tnLst>
+  </p:timing>
 </p:sld>
 </file>
 
@@ -3768,6 +3850,13 @@
   <p:clrMapOvr>
     <a:masterClrMapping/>
   </p:clrMapOvr>
+  <p:timing>
+    <p:tnLst>
+      <p:par>
+        <p:cTn id="1" dur="indefinite" restart="never" nodeType="tmRoot"/>
+      </p:par>
+    </p:tnLst>
+  </p:timing>
 </p:sld>
 </file>
 
@@ -3874,6 +3963,13 @@
   <p:clrMapOvr>
     <a:masterClrMapping/>
   </p:clrMapOvr>
+  <p:timing>
+    <p:tnLst>
+      <p:par>
+        <p:cTn id="1" dur="indefinite" restart="never" nodeType="tmRoot"/>
+      </p:par>
+    </p:tnLst>
+  </p:timing>
 </p:sld>
 </file>
 
@@ -3991,19 +4087,7 @@
           <a:p>
             <a:r>
               <a:rPr lang="en-US" sz="3600" dirty="0" smtClean="0"/>
-              <a:t>ste</a:t>
-            </a:r>
-            <a:r>
-              <a:rPr lang="en-US" sz="3600" dirty="0"/>
-              <a:t>p</a:t>
-            </a:r>
-            <a:r>
-              <a:rPr lang="en-US" sz="3600" dirty="0" smtClean="0"/>
-              <a:t> </a:t>
-            </a:r>
-            <a:r>
-              <a:rPr lang="en-US" sz="3600" dirty="0" smtClean="0"/>
-              <a:t>through creating a karma.conf.js file</a:t>
+              <a:t>Karma will step through the configuration</a:t>
             </a:r>
             <a:endParaRPr lang="en-US" sz="3600" dirty="0"/>
           </a:p>
@@ -4019,6 +4103,13 @@
   <p:clrMapOvr>
     <a:masterClrMapping/>
   </p:clrMapOvr>
+  <p:timing>
+    <p:tnLst>
+      <p:par>
+        <p:cTn id="1" dur="indefinite" restart="never" nodeType="tmRoot"/>
+      </p:par>
+    </p:tnLst>
+  </p:timing>
 </p:sld>
 </file>
 
@@ -4080,6 +4171,13 @@
   <p:clrMapOvr>
     <a:masterClrMapping/>
   </p:clrMapOvr>
+  <p:timing>
+    <p:tnLst>
+      <p:par>
+        <p:cTn id="1" dur="indefinite" restart="never" nodeType="tmRoot"/>
+      </p:par>
+    </p:tnLst>
+  </p:timing>
 </p:sld>
 </file>
 
@@ -4185,27 +4283,19 @@
           <a:p>
             <a:r>
               <a:rPr lang="en-US" sz="3600" dirty="0" smtClean="0"/>
-              <a:t>Plugins </a:t>
-            </a:r>
+              <a:t>Plugins for module loaders </a:t>
+            </a:r>
+          </a:p>
+          <a:p>
+            <a:endParaRPr lang="en-US" sz="3600" dirty="0" smtClean="0"/>
+          </a:p>
+          <a:p>
+            <a:endParaRPr lang="en-US" sz="3600" dirty="0"/>
+          </a:p>
+          <a:p>
             <a:r>
               <a:rPr lang="en-US" sz="3600" dirty="0" smtClean="0"/>
-              <a:t>for module loaders </a:t>
-            </a:r>
-          </a:p>
-          <a:p>
-            <a:endParaRPr lang="en-US" sz="3600" dirty="0" smtClean="0"/>
-          </a:p>
-          <a:p>
-            <a:endParaRPr lang="en-US" sz="3600" dirty="0"/>
-          </a:p>
-          <a:p>
-            <a:r>
-              <a:rPr lang="en-US" sz="3600" dirty="0" smtClean="0"/>
-              <a:t>Plugins </a:t>
-            </a:r>
-            <a:r>
-              <a:rPr lang="en-US" sz="3600" dirty="0" smtClean="0"/>
-              <a:t>like jasmine-</a:t>
+              <a:t>Plugins like jasmine-</a:t>
             </a:r>
             <a:r>
               <a:rPr lang="en-US" sz="3600" dirty="0" err="1" smtClean="0"/>
@@ -4221,11 +4311,7 @@
             </a:r>
             <a:r>
               <a:rPr lang="en-US" sz="3600" dirty="0" smtClean="0"/>
-              <a:t>, </a:t>
-            </a:r>
-            <a:r>
-              <a:rPr lang="en-US" sz="3600" dirty="0" smtClean="0"/>
-              <a:t>many more</a:t>
+              <a:t>, many more</a:t>
             </a:r>
             <a:endParaRPr lang="en-US" sz="3600" dirty="0"/>
           </a:p>
@@ -4241,6 +4327,13 @@
   <p:clrMapOvr>
     <a:masterClrMapping/>
   </p:clrMapOvr>
+  <p:timing>
+    <p:tnLst>
+      <p:par>
+        <p:cTn id="1" dur="indefinite" restart="never" nodeType="tmRoot"/>
+      </p:par>
+    </p:tnLst>
+  </p:timing>
 </p:sld>
 </file>
 
@@ -4377,6 +4470,13 @@
   <p:clrMapOvr>
     <a:masterClrMapping/>
   </p:clrMapOvr>
+  <p:timing>
+    <p:tnLst>
+      <p:par>
+        <p:cTn id="1" dur="indefinite" restart="never" nodeType="tmRoot"/>
+      </p:par>
+    </p:tnLst>
+  </p:timing>
 </p:sld>
 </file>
 
@@ -4504,25 +4604,8 @@
           <a:p>
             <a:r>
               <a:rPr lang="en-US" sz="3600" dirty="0" smtClean="0"/>
-              <a:t>karma </a:t>
-            </a:r>
-            <a:r>
-              <a:rPr lang="en-US" sz="3600" dirty="0" smtClean="0"/>
-              <a:t>will watch </a:t>
-            </a:r>
-            <a:r>
-              <a:rPr lang="en-US" sz="3600" dirty="0" smtClean="0"/>
-              <a:t>files </a:t>
-            </a:r>
-            <a:r>
-              <a:rPr lang="en-US" sz="3600" dirty="0" smtClean="0"/>
-              <a:t>and rerun tests </a:t>
-            </a:r>
-            <a:r>
-              <a:rPr lang="en-US" sz="3600" dirty="0" smtClean="0"/>
-              <a:t>on save</a:t>
-            </a:r>
-            <a:endParaRPr lang="en-US" sz="3600" dirty="0" smtClean="0"/>
+              <a:t>karma will watch files and rerun tests on save</a:t>
+            </a:r>
           </a:p>
         </p:txBody>
       </p:sp>
@@ -4536,6 +4619,13 @@
   <p:clrMapOvr>
     <a:masterClrMapping/>
   </p:clrMapOvr>
+  <p:timing>
+    <p:tnLst>
+      <p:par>
+        <p:cTn id="1" dur="indefinite" restart="never" nodeType="tmRoot"/>
+      </p:par>
+    </p:tnLst>
+  </p:timing>
 </p:sld>
 </file>
 
@@ -4679,6 +4769,13 @@
   <p:clrMapOvr>
     <a:masterClrMapping/>
   </p:clrMapOvr>
+  <p:timing>
+    <p:tnLst>
+      <p:par>
+        <p:cTn id="1" dur="indefinite" restart="never" nodeType="tmRoot"/>
+      </p:par>
+    </p:tnLst>
+  </p:timing>
 </p:sld>
 </file>
 
@@ -4785,30 +4882,17 @@
             </a:r>
             <a:r>
               <a:rPr lang="en-US" sz="3600" dirty="0" smtClean="0"/>
-              <a:t>arma will serve the file with </a:t>
-            </a:r>
+              <a:t>arma will serve the file with its webserver</a:t>
+            </a:r>
+          </a:p>
+          <a:p>
+            <a:endParaRPr lang="en-US" sz="3600" dirty="0" smtClean="0"/>
+          </a:p>
+          <a:p>
             <a:r>
               <a:rPr lang="en-US" sz="3600" dirty="0" smtClean="0"/>
-              <a:t>its </a:t>
-            </a:r>
-            <a:r>
-              <a:rPr lang="en-US" sz="3600" dirty="0" smtClean="0"/>
-              <a:t>webserver</a:t>
-            </a:r>
-          </a:p>
-          <a:p>
-            <a:endParaRPr lang="en-US" sz="3600" dirty="0" smtClean="0"/>
-          </a:p>
-          <a:p>
-            <a:r>
-              <a:rPr lang="en-US" sz="3600" dirty="0" smtClean="0"/>
-              <a:t>Set to false </a:t>
-            </a:r>
-            <a:r>
-              <a:rPr lang="en-US" sz="3600" dirty="0" smtClean="0"/>
-              <a:t>when only including for watch option</a:t>
-            </a:r>
-            <a:endParaRPr lang="en-US" sz="3600" dirty="0" smtClean="0"/>
+              <a:t>Set to false when only including for watch option</a:t>
+            </a:r>
           </a:p>
         </p:txBody>
       </p:sp>
@@ -4822,6 +4906,13 @@
   <p:clrMapOvr>
     <a:masterClrMapping/>
   </p:clrMapOvr>
+  <p:timing>
+    <p:tnLst>
+      <p:par>
+        <p:cTn id="1" dur="indefinite" restart="never" nodeType="tmRoot"/>
+      </p:par>
+    </p:tnLst>
+  </p:timing>
 </p:sld>
 </file>
 
@@ -5080,7 +5171,7 @@
   <a:extraClrSchemeLst/>
   <a:extLst>
     <a:ext uri="{05A4C25C-085E-4340-85A3-A5531E510DB2}">
-      <thm15:themeFamily xmlns="" xmlns:thm15="http://schemas.microsoft.com/office/thememl/2012/main" name="Office Theme" id="{62F939B6-93AF-4DB8-9C6B-D6C7DFDC589F}" vid="{4A3C46E8-61CC-4603-A589-7422A47A8E4A}"/>
+      <thm15:themeFamily xmlns:thm15="http://schemas.microsoft.com/office/thememl/2012/main" xmlns="" name="Office Theme" id="{62F939B6-93AF-4DB8-9C6B-D6C7DFDC589F}" vid="{4A3C46E8-61CC-4603-A589-7422A47A8E4A}"/>
     </a:ext>
   </a:extLst>
 </a:theme>

</xml_diff>

<commit_message>
adding karma and karma-cli to install step
</commit_message>
<xml_diff>
--- a/karma-demo-slides.pptx
+++ b/karma-demo-slides.pptx
@@ -120,7 +120,7 @@
   </p:defaultTextStyle>
   <p:extLst>
     <p:ext uri="{EFAFB233-063F-42B5-8137-9DF3F51BA10A}">
-      <p15:sldGuideLst xmlns:p15="http://schemas.microsoft.com/office/powerpoint/2012/main" xmlns=""/>
+      <p15:sldGuideLst xmlns="" xmlns:p15="http://schemas.microsoft.com/office/powerpoint/2012/main"/>
     </p:ext>
   </p:extLst>
 </p:presentation>
@@ -3481,14 +3481,7 @@
                 <a:latin typeface="Consolas" panose="020B0609020204030204" pitchFamily="49" charset="0"/>
                 <a:cs typeface="Consolas" panose="020B0609020204030204" pitchFamily="49" charset="0"/>
               </a:rPr>
-              <a:t>: { type: ‘text-summary’ //‘html’ </a:t>
-            </a:r>
-            <a:r>
-              <a:rPr lang="en-US" dirty="0" smtClean="0">
-                <a:latin typeface="Consolas" panose="020B0609020204030204" pitchFamily="49" charset="0"/>
-                <a:cs typeface="Consolas" panose="020B0609020204030204" pitchFamily="49" charset="0"/>
-              </a:rPr>
-              <a:t>}</a:t>
+              <a:t>: { type: ‘text-summary’ //‘html’ }</a:t>
             </a:r>
           </a:p>
           <a:p>
@@ -3530,10 +3523,6 @@
               </a:rPr>
               <a:t>to calculate coverage metrics</a:t>
             </a:r>
-            <a:endParaRPr lang="en-US" dirty="0" smtClean="0">
-              <a:latin typeface="Consolas" panose="020B0609020204030204" pitchFamily="49" charset="0"/>
-              <a:cs typeface="Consolas" panose="020B0609020204030204" pitchFamily="49" charset="0"/>
-            </a:endParaRPr>
           </a:p>
         </p:txBody>
       </p:sp>
@@ -4041,6 +4030,32 @@
               <a:buNone/>
             </a:pPr>
             <a:r>
+              <a:rPr lang="en-US" sz="3600" dirty="0" err="1">
+                <a:latin typeface="Consolas" panose="020B0609020204030204" pitchFamily="49" charset="0"/>
+                <a:cs typeface="Consolas" panose="020B0609020204030204" pitchFamily="49" charset="0"/>
+              </a:rPr>
+              <a:t>npm</a:t>
+            </a:r>
+            <a:r>
+              <a:rPr lang="en-US" sz="3600" dirty="0">
+                <a:latin typeface="Consolas" panose="020B0609020204030204" pitchFamily="49" charset="0"/>
+                <a:cs typeface="Consolas" panose="020B0609020204030204" pitchFamily="49" charset="0"/>
+              </a:rPr>
+              <a:t> install -g </a:t>
+            </a:r>
+            <a:r>
+              <a:rPr lang="en-US" sz="3600" dirty="0" smtClean="0">
+                <a:latin typeface="Consolas" panose="020B0609020204030204" pitchFamily="49" charset="0"/>
+                <a:cs typeface="Consolas" panose="020B0609020204030204" pitchFamily="49" charset="0"/>
+              </a:rPr>
+              <a:t>karma</a:t>
+            </a:r>
+          </a:p>
+          <a:p>
+            <a:pPr marL="0" indent="0">
+              <a:buNone/>
+            </a:pPr>
+            <a:r>
               <a:rPr lang="en-US" sz="3600" dirty="0" err="1" smtClean="0">
                 <a:latin typeface="Consolas" panose="020B0609020204030204" pitchFamily="49" charset="0"/>
                 <a:cs typeface="Consolas" panose="020B0609020204030204" pitchFamily="49" charset="0"/>
@@ -4052,7 +4067,14 @@
                 <a:latin typeface="Consolas" panose="020B0609020204030204" pitchFamily="49" charset="0"/>
                 <a:cs typeface="Consolas" panose="020B0609020204030204" pitchFamily="49" charset="0"/>
               </a:rPr>
-              <a:t> install -g karma-cli</a:t>
+              <a:t> </a:t>
+            </a:r>
+            <a:r>
+              <a:rPr lang="en-US" sz="3600" dirty="0" smtClean="0">
+                <a:latin typeface="Consolas" panose="020B0609020204030204" pitchFamily="49" charset="0"/>
+                <a:cs typeface="Consolas" panose="020B0609020204030204" pitchFamily="49" charset="0"/>
+              </a:rPr>
+              <a:t>install -g karma-cli</a:t>
             </a:r>
           </a:p>
           <a:p>
@@ -5171,7 +5193,7 @@
   <a:extraClrSchemeLst/>
   <a:extLst>
     <a:ext uri="{05A4C25C-085E-4340-85A3-A5531E510DB2}">
-      <thm15:themeFamily xmlns:thm15="http://schemas.microsoft.com/office/thememl/2012/main" xmlns="" name="Office Theme" id="{62F939B6-93AF-4DB8-9C6B-D6C7DFDC589F}" vid="{4A3C46E8-61CC-4603-A589-7422A47A8E4A}"/>
+      <thm15:themeFamily xmlns="" xmlns:thm15="http://schemas.microsoft.com/office/thememl/2012/main" name="Office Theme" id="{62F939B6-93AF-4DB8-9C6B-D6C7DFDC589F}" vid="{4A3C46E8-61CC-4603-A589-7422A47A8E4A}"/>
     </a:ext>
   </a:extLst>
 </a:theme>

</xml_diff>

<commit_message>
updating fonts to make it clear what is code/configuration
</commit_message>
<xml_diff>
--- a/karma-demo-slides.pptx
+++ b/karma-demo-slides.pptx
@@ -120,7 +120,7 @@
   </p:defaultTextStyle>
   <p:extLst>
     <p:ext uri="{EFAFB233-063F-42B5-8137-9DF3F51BA10A}">
-      <p15:sldGuideLst xmlns="" xmlns:p15="http://schemas.microsoft.com/office/powerpoint/2012/main"/>
+      <p15:sldGuideLst xmlns:p15="http://schemas.microsoft.com/office/powerpoint/2012/main" xmlns=""/>
     </p:ext>
   </p:extLst>
 </p:presentation>
@@ -257,7 +257,7 @@
           <a:p>
             <a:fld id="{EEA2338F-4137-4D41-9621-F1822CC7677A}" type="datetimeFigureOut">
               <a:rPr lang="en-US" smtClean="0"/>
-              <a:t>9/21/2014</a:t>
+              <a:t>9/23/2014</a:t>
             </a:fld>
             <a:endParaRPr lang="en-US"/>
           </a:p>
@@ -427,7 +427,7 @@
           <a:p>
             <a:fld id="{EEA2338F-4137-4D41-9621-F1822CC7677A}" type="datetimeFigureOut">
               <a:rPr lang="en-US" smtClean="0"/>
-              <a:t>9/21/2014</a:t>
+              <a:t>9/23/2014</a:t>
             </a:fld>
             <a:endParaRPr lang="en-US"/>
           </a:p>
@@ -607,7 +607,7 @@
           <a:p>
             <a:fld id="{EEA2338F-4137-4D41-9621-F1822CC7677A}" type="datetimeFigureOut">
               <a:rPr lang="en-US" smtClean="0"/>
-              <a:t>9/21/2014</a:t>
+              <a:t>9/23/2014</a:t>
             </a:fld>
             <a:endParaRPr lang="en-US"/>
           </a:p>
@@ -777,7 +777,7 @@
           <a:p>
             <a:fld id="{EEA2338F-4137-4D41-9621-F1822CC7677A}" type="datetimeFigureOut">
               <a:rPr lang="en-US" smtClean="0"/>
-              <a:t>9/21/2014</a:t>
+              <a:t>9/23/2014</a:t>
             </a:fld>
             <a:endParaRPr lang="en-US"/>
           </a:p>
@@ -1023,7 +1023,7 @@
           <a:p>
             <a:fld id="{EEA2338F-4137-4D41-9621-F1822CC7677A}" type="datetimeFigureOut">
               <a:rPr lang="en-US" smtClean="0"/>
-              <a:t>9/21/2014</a:t>
+              <a:t>9/23/2014</a:t>
             </a:fld>
             <a:endParaRPr lang="en-US"/>
           </a:p>
@@ -1255,7 +1255,7 @@
           <a:p>
             <a:fld id="{EEA2338F-4137-4D41-9621-F1822CC7677A}" type="datetimeFigureOut">
               <a:rPr lang="en-US" smtClean="0"/>
-              <a:t>9/21/2014</a:t>
+              <a:t>9/23/2014</a:t>
             </a:fld>
             <a:endParaRPr lang="en-US"/>
           </a:p>
@@ -1622,7 +1622,7 @@
           <a:p>
             <a:fld id="{EEA2338F-4137-4D41-9621-F1822CC7677A}" type="datetimeFigureOut">
               <a:rPr lang="en-US" smtClean="0"/>
-              <a:t>9/21/2014</a:t>
+              <a:t>9/23/2014</a:t>
             </a:fld>
             <a:endParaRPr lang="en-US"/>
           </a:p>
@@ -1740,7 +1740,7 @@
           <a:p>
             <a:fld id="{EEA2338F-4137-4D41-9621-F1822CC7677A}" type="datetimeFigureOut">
               <a:rPr lang="en-US" smtClean="0"/>
-              <a:t>9/21/2014</a:t>
+              <a:t>9/23/2014</a:t>
             </a:fld>
             <a:endParaRPr lang="en-US"/>
           </a:p>
@@ -1835,7 +1835,7 @@
           <a:p>
             <a:fld id="{EEA2338F-4137-4D41-9621-F1822CC7677A}" type="datetimeFigureOut">
               <a:rPr lang="en-US" smtClean="0"/>
-              <a:t>9/21/2014</a:t>
+              <a:t>9/23/2014</a:t>
             </a:fld>
             <a:endParaRPr lang="en-US"/>
           </a:p>
@@ -2112,7 +2112,7 @@
           <a:p>
             <a:fld id="{EEA2338F-4137-4D41-9621-F1822CC7677A}" type="datetimeFigureOut">
               <a:rPr lang="en-US" smtClean="0"/>
-              <a:t>9/21/2014</a:t>
+              <a:t>9/23/2014</a:t>
             </a:fld>
             <a:endParaRPr lang="en-US"/>
           </a:p>
@@ -2365,7 +2365,7 @@
           <a:p>
             <a:fld id="{EEA2338F-4137-4D41-9621-F1822CC7677A}" type="datetimeFigureOut">
               <a:rPr lang="en-US" smtClean="0"/>
-              <a:t>9/21/2014</a:t>
+              <a:t>9/23/2014</a:t>
             </a:fld>
             <a:endParaRPr lang="en-US"/>
           </a:p>
@@ -2430,9 +2430,12 @@
 <p:sldMaster xmlns:a="http://schemas.openxmlformats.org/drawingml/2006/main" xmlns:r="http://schemas.openxmlformats.org/officeDocument/2006/relationships" xmlns:p="http://schemas.openxmlformats.org/presentationml/2006/main">
   <p:cSld>
     <p:bg>
-      <p:bgRef idx="1001">
-        <a:schemeClr val="bg1"/>
-      </p:bgRef>
+      <p:bgPr>
+        <a:solidFill>
+          <a:schemeClr val="bg1"/>
+        </a:solidFill>
+        <a:effectLst/>
+      </p:bgPr>
     </p:bg>
     <p:spTree>
       <p:nvGrpSpPr>
@@ -2578,7 +2581,7 @@
           <a:p>
             <a:fld id="{EEA2338F-4137-4D41-9621-F1822CC7677A}" type="datetimeFigureOut">
               <a:rPr lang="en-US" smtClean="0"/>
-              <a:t>9/21/2014</a:t>
+              <a:t>9/23/2014</a:t>
             </a:fld>
             <a:endParaRPr lang="en-US"/>
           </a:p>
@@ -3006,10 +3009,18 @@
           <a:lstStyle/>
           <a:p>
             <a:r>
-              <a:rPr lang="en-US" sz="4800" dirty="0" smtClean="0"/>
+              <a:rPr lang="en-US" sz="4800" dirty="0" smtClean="0">
+                <a:solidFill>
+                  <a:schemeClr val="tx2"/>
+                </a:solidFill>
+              </a:rPr>
               <a:t>Automating the Unit Test Process with Karma</a:t>
             </a:r>
-            <a:endParaRPr lang="en-US" sz="4800" dirty="0"/>
+            <a:endParaRPr lang="en-US" sz="4800" dirty="0">
+              <a:solidFill>
+                <a:schemeClr val="tx2"/>
+              </a:solidFill>
+            </a:endParaRPr>
           </a:p>
         </p:txBody>
       </p:sp>
@@ -3037,14 +3048,22 @@
           <a:p>
             <a:pPr algn="l"/>
             <a:r>
-              <a:rPr lang="en-US" sz="3200" dirty="0" smtClean="0"/>
+              <a:rPr lang="en-US" sz="3200" dirty="0" smtClean="0">
+                <a:solidFill>
+                  <a:schemeClr val="tx2"/>
+                </a:solidFill>
+              </a:rPr>
               <a:t>Kevin Phillips</a:t>
             </a:r>
           </a:p>
           <a:p>
             <a:pPr algn="l"/>
             <a:r>
-              <a:rPr lang="en-US" sz="3200" dirty="0" smtClean="0"/>
+              <a:rPr lang="en-US" sz="3200" dirty="0" smtClean="0">
+                <a:solidFill>
+                  <a:schemeClr val="tx2"/>
+                </a:solidFill>
+              </a:rPr>
               <a:t>Front End Developer, Cars.com</a:t>
             </a:r>
           </a:p>
@@ -3115,22 +3134,42 @@
           <a:lstStyle/>
           <a:p>
             <a:r>
-              <a:rPr lang="en-US" sz="5400" dirty="0" err="1"/>
+              <a:rPr lang="en-US" sz="5400" dirty="0" err="1">
+                <a:solidFill>
+                  <a:schemeClr val="tx2"/>
+                </a:solidFill>
+              </a:rPr>
               <a:t>Config</a:t>
             </a:r>
             <a:r>
-              <a:rPr lang="en-US" sz="5400" dirty="0"/>
+              <a:rPr lang="en-US" sz="5400" dirty="0">
+                <a:solidFill>
+                  <a:schemeClr val="tx2"/>
+                </a:solidFill>
+              </a:rPr>
               <a:t> </a:t>
             </a:r>
             <a:r>
-              <a:rPr lang="en-US" sz="5400" dirty="0" smtClean="0"/>
+              <a:rPr lang="en-US" sz="5400" dirty="0" smtClean="0">
+                <a:solidFill>
+                  <a:schemeClr val="tx2"/>
+                </a:solidFill>
+              </a:rPr>
               <a:t>Options – </a:t>
             </a:r>
             <a:r>
-              <a:rPr lang="en-US" sz="5400" dirty="0" err="1" smtClean="0"/>
+              <a:rPr lang="en-US" sz="5400" dirty="0" err="1" smtClean="0">
+                <a:solidFill>
+                  <a:schemeClr val="tx2"/>
+                </a:solidFill>
+              </a:rPr>
               <a:t>autoWatch</a:t>
             </a:r>
-            <a:endParaRPr lang="en-US" sz="5400" dirty="0"/>
+            <a:endParaRPr lang="en-US" sz="5400" dirty="0">
+              <a:solidFill>
+                <a:schemeClr val="tx2"/>
+              </a:solidFill>
+            </a:endParaRPr>
           </a:p>
         </p:txBody>
       </p:sp>
@@ -3150,23 +3189,43 @@
           <a:lstStyle/>
           <a:p>
             <a:r>
-              <a:rPr lang="en-US" sz="3600" dirty="0"/>
+              <a:rPr lang="en-US" sz="3600" dirty="0">
+                <a:solidFill>
+                  <a:schemeClr val="tx2"/>
+                </a:solidFill>
+              </a:rPr>
               <a:t>f</a:t>
             </a:r>
             <a:r>
-              <a:rPr lang="en-US" sz="3600" dirty="0" smtClean="0"/>
+              <a:rPr lang="en-US" sz="3600" dirty="0" smtClean="0">
+                <a:solidFill>
+                  <a:schemeClr val="tx2"/>
+                </a:solidFill>
+              </a:rPr>
               <a:t>alse – run tests once</a:t>
             </a:r>
           </a:p>
           <a:p>
-            <a:endParaRPr lang="en-US" sz="3600" dirty="0" smtClean="0"/>
-          </a:p>
-          <a:p>
-            <a:r>
-              <a:rPr lang="en-US" sz="3600" dirty="0" smtClean="0"/>
+            <a:endParaRPr lang="en-US" sz="3600" dirty="0" smtClean="0">
+              <a:solidFill>
+                <a:schemeClr val="tx2"/>
+              </a:solidFill>
+            </a:endParaRPr>
+          </a:p>
+          <a:p>
+            <a:r>
+              <a:rPr lang="en-US" sz="3600" dirty="0" smtClean="0">
+                <a:solidFill>
+                  <a:schemeClr val="tx2"/>
+                </a:solidFill>
+              </a:rPr>
               <a:t>true – run tests, watch for changes, and rerun</a:t>
             </a:r>
-            <a:endParaRPr lang="en-US" sz="3600" dirty="0"/>
+            <a:endParaRPr lang="en-US" sz="3600" dirty="0">
+              <a:solidFill>
+                <a:schemeClr val="tx2"/>
+              </a:solidFill>
+            </a:endParaRPr>
           </a:p>
           <a:p>
             <a:endParaRPr lang="en-US" dirty="0"/>
@@ -3228,11 +3287,19 @@
           <a:lstStyle/>
           <a:p>
             <a:r>
-              <a:rPr lang="en-US" sz="5400" dirty="0" err="1"/>
+              <a:rPr lang="en-US" sz="5400" dirty="0" err="1">
+                <a:solidFill>
+                  <a:schemeClr val="tx2"/>
+                </a:solidFill>
+              </a:rPr>
               <a:t>Config</a:t>
             </a:r>
             <a:r>
-              <a:rPr lang="en-US" sz="5400" dirty="0"/>
+              <a:rPr lang="en-US" sz="5400" dirty="0">
+                <a:solidFill>
+                  <a:schemeClr val="tx2"/>
+                </a:solidFill>
+              </a:rPr>
               <a:t> Options – browsers</a:t>
             </a:r>
           </a:p>
@@ -3256,62 +3323,104 @@
           <a:lstStyle/>
           <a:p>
             <a:r>
-              <a:rPr lang="en-US" sz="3600" dirty="0" smtClean="0"/>
+              <a:rPr lang="en-US" sz="3600" dirty="0" smtClean="0">
+                <a:solidFill>
+                  <a:schemeClr val="tx2"/>
+                </a:solidFill>
+              </a:rPr>
               <a:t>Choose 1 or more browsers to run tests in</a:t>
             </a:r>
           </a:p>
           <a:p>
             <a:pPr lvl="1"/>
             <a:r>
-              <a:rPr lang="en-US" sz="3600" dirty="0" smtClean="0"/>
+              <a:rPr lang="en-US" sz="3600" dirty="0" smtClean="0">
+                <a:solidFill>
+                  <a:schemeClr val="tx2"/>
+                </a:solidFill>
+              </a:rPr>
               <a:t>Chrome</a:t>
             </a:r>
           </a:p>
           <a:p>
             <a:pPr lvl="1"/>
             <a:r>
-              <a:rPr lang="en-US" sz="3600" dirty="0" smtClean="0"/>
+              <a:rPr lang="en-US" sz="3600" dirty="0" smtClean="0">
+                <a:solidFill>
+                  <a:schemeClr val="tx2"/>
+                </a:solidFill>
+              </a:rPr>
               <a:t>Firefox</a:t>
             </a:r>
           </a:p>
           <a:p>
             <a:pPr lvl="1"/>
             <a:r>
-              <a:rPr lang="en-US" sz="3600" dirty="0" smtClean="0"/>
+              <a:rPr lang="en-US" sz="3600" dirty="0" smtClean="0">
+                <a:solidFill>
+                  <a:schemeClr val="tx2"/>
+                </a:solidFill>
+              </a:rPr>
               <a:t>IE</a:t>
             </a:r>
           </a:p>
           <a:p>
             <a:pPr lvl="1"/>
             <a:r>
-              <a:rPr lang="en-US" sz="3600" dirty="0" smtClean="0"/>
+              <a:rPr lang="en-US" sz="3600" dirty="0" smtClean="0">
+                <a:solidFill>
+                  <a:schemeClr val="tx2"/>
+                </a:solidFill>
+              </a:rPr>
               <a:t>Safari</a:t>
             </a:r>
           </a:p>
           <a:p>
             <a:pPr lvl="1"/>
             <a:r>
-              <a:rPr lang="en-US" sz="3600" dirty="0" err="1" smtClean="0"/>
+              <a:rPr lang="en-US" sz="3600" dirty="0" err="1" smtClean="0">
+                <a:solidFill>
+                  <a:schemeClr val="tx2"/>
+                </a:solidFill>
+              </a:rPr>
               <a:t>PhantomJS</a:t>
             </a:r>
-            <a:endParaRPr lang="en-US" sz="3600" dirty="0" smtClean="0"/>
+            <a:endParaRPr lang="en-US" sz="3600" dirty="0" smtClean="0">
+              <a:solidFill>
+                <a:schemeClr val="tx2"/>
+              </a:solidFill>
+            </a:endParaRPr>
           </a:p>
           <a:p>
             <a:pPr lvl="1"/>
-            <a:endParaRPr lang="en-US" sz="3600" dirty="0"/>
-          </a:p>
-          <a:p>
-            <a:r>
-              <a:rPr lang="en-US" sz="3600" dirty="0" smtClean="0"/>
-              <a:t>Can also connect to Karma from mobile devices</a:t>
-            </a:r>
-            <a:endParaRPr lang="en-US" sz="3600" dirty="0"/>
-          </a:p>
-          <a:p>
-            <a:pPr marL="0" indent="0">
-              <a:buNone/>
-            </a:pPr>
-            <a:endParaRPr lang="en-US" sz="3600" dirty="0"/>
+            <a:endParaRPr lang="en-US" sz="3600" dirty="0">
+              <a:solidFill>
+                <a:schemeClr val="tx2"/>
+              </a:solidFill>
+            </a:endParaRPr>
+          </a:p>
+          <a:p>
+            <a:r>
+              <a:rPr lang="en-US" sz="3600" dirty="0" smtClean="0">
+                <a:solidFill>
+                  <a:schemeClr val="tx2"/>
+                </a:solidFill>
+              </a:rPr>
+              <a:t>Can also connect to Karma from mobile </a:t>
+            </a:r>
+            <a:r>
+              <a:rPr lang="en-US" sz="3600" dirty="0" smtClean="0">
+                <a:solidFill>
+                  <a:schemeClr val="tx2"/>
+                </a:solidFill>
+              </a:rPr>
+              <a:t>devices</a:t>
+            </a:r>
+            <a:endParaRPr lang="en-US" sz="3600" dirty="0">
+              <a:solidFill>
+                <a:schemeClr val="tx2"/>
+              </a:solidFill>
+            </a:endParaRPr>
           </a:p>
         </p:txBody>
       </p:sp>
@@ -3370,11 +3479,19 @@
           <a:lstStyle/>
           <a:p>
             <a:r>
-              <a:rPr lang="en-US" sz="5400" dirty="0" err="1"/>
+              <a:rPr lang="en-US" sz="5400" dirty="0" err="1">
+                <a:solidFill>
+                  <a:schemeClr val="tx2"/>
+                </a:solidFill>
+              </a:rPr>
               <a:t>Config</a:t>
             </a:r>
             <a:r>
-              <a:rPr lang="en-US" sz="5400" dirty="0"/>
+              <a:rPr lang="en-US" sz="5400" dirty="0">
+                <a:solidFill>
+                  <a:schemeClr val="tx2"/>
+                </a:solidFill>
+              </a:rPr>
               <a:t> Options – coverage</a:t>
             </a:r>
           </a:p>
@@ -3399,14 +3516,14 @@
               <a:buNone/>
             </a:pPr>
             <a:r>
-              <a:rPr lang="en-US" dirty="0">
+              <a:rPr lang="en-US" b="1" dirty="0">
                 <a:latin typeface="Consolas" panose="020B0609020204030204" pitchFamily="49" charset="0"/>
                 <a:cs typeface="Consolas" panose="020B0609020204030204" pitchFamily="49" charset="0"/>
               </a:rPr>
               <a:t>r</a:t>
             </a:r>
             <a:r>
-              <a:rPr lang="en-US" dirty="0" smtClean="0">
+              <a:rPr lang="en-US" b="1" dirty="0" smtClean="0">
                 <a:latin typeface="Consolas" panose="020B0609020204030204" pitchFamily="49" charset="0"/>
                 <a:cs typeface="Consolas" panose="020B0609020204030204" pitchFamily="49" charset="0"/>
               </a:rPr>
@@ -3414,7 +3531,7 @@
             </a:r>
           </a:p>
           <a:p>
-            <a:endParaRPr lang="en-US" dirty="0" smtClean="0">
+            <a:endParaRPr lang="en-US" b="1" dirty="0" smtClean="0">
               <a:latin typeface="Consolas" panose="020B0609020204030204" pitchFamily="49" charset="0"/>
               <a:cs typeface="Consolas" panose="020B0609020204030204" pitchFamily="49" charset="0"/>
             </a:endParaRPr>
@@ -3424,35 +3541,35 @@
               <a:buNone/>
             </a:pPr>
             <a:r>
-              <a:rPr lang="en-US" dirty="0" smtClean="0">
+              <a:rPr lang="en-US" b="1" dirty="0" smtClean="0">
                 <a:latin typeface="Consolas" panose="020B0609020204030204" pitchFamily="49" charset="0"/>
                 <a:cs typeface="Consolas" panose="020B0609020204030204" pitchFamily="49" charset="0"/>
               </a:rPr>
               <a:t>preprocessors : { </a:t>
             </a:r>
             <a:r>
-              <a:rPr lang="en-US" dirty="0">
+              <a:rPr lang="en-US" b="1" dirty="0">
                 <a:latin typeface="Consolas" panose="020B0609020204030204" pitchFamily="49" charset="0"/>
                 <a:cs typeface="Consolas" panose="020B0609020204030204" pitchFamily="49" charset="0"/>
               </a:rPr>
               <a:t> </a:t>
             </a:r>
             <a:r>
-              <a:rPr lang="en-US" dirty="0" smtClean="0">
+              <a:rPr lang="en-US" b="1" dirty="0" smtClean="0">
                 <a:latin typeface="Consolas" panose="020B0609020204030204" pitchFamily="49" charset="0"/>
                 <a:cs typeface="Consolas" panose="020B0609020204030204" pitchFamily="49" charset="0"/>
               </a:rPr>
               <a:t>&lt;</a:t>
             </a:r>
             <a:r>
-              <a:rPr lang="en-US" dirty="0" err="1" smtClean="0">
+              <a:rPr lang="en-US" b="1" dirty="0" err="1" smtClean="0">
                 <a:latin typeface="Consolas" panose="020B0609020204030204" pitchFamily="49" charset="0"/>
                 <a:cs typeface="Consolas" panose="020B0609020204030204" pitchFamily="49" charset="0"/>
               </a:rPr>
               <a:t>src</a:t>
             </a:r>
             <a:r>
-              <a:rPr lang="en-US" dirty="0" smtClean="0">
+              <a:rPr lang="en-US" b="1" dirty="0" smtClean="0">
                 <a:latin typeface="Consolas" panose="020B0609020204030204" pitchFamily="49" charset="0"/>
                 <a:cs typeface="Consolas" panose="020B0609020204030204" pitchFamily="49" charset="0"/>
               </a:rPr>
@@ -3460,7 +3577,7 @@
             </a:r>
           </a:p>
           <a:p>
-            <a:endParaRPr lang="en-US" dirty="0" smtClean="0">
+            <a:endParaRPr lang="en-US" b="1" dirty="0" smtClean="0">
               <a:latin typeface="Consolas" panose="020B0609020204030204" pitchFamily="49" charset="0"/>
               <a:cs typeface="Consolas" panose="020B0609020204030204" pitchFamily="49" charset="0"/>
             </a:endParaRPr>
@@ -3470,14 +3587,14 @@
               <a:buNone/>
             </a:pPr>
             <a:r>
-              <a:rPr lang="en-US" dirty="0" err="1" smtClean="0">
+              <a:rPr lang="en-US" b="1" dirty="0" err="1" smtClean="0">
                 <a:latin typeface="Consolas" panose="020B0609020204030204" pitchFamily="49" charset="0"/>
                 <a:cs typeface="Consolas" panose="020B0609020204030204" pitchFamily="49" charset="0"/>
               </a:rPr>
               <a:t>coverageReporter</a:t>
             </a:r>
             <a:r>
-              <a:rPr lang="en-US" dirty="0" smtClean="0">
+              <a:rPr lang="en-US" b="1" dirty="0" smtClean="0">
                 <a:latin typeface="Consolas" panose="020B0609020204030204" pitchFamily="49" charset="0"/>
                 <a:cs typeface="Consolas" panose="020B0609020204030204" pitchFamily="49" charset="0"/>
               </a:rPr>
@@ -3496,6 +3613,9 @@
           <a:p>
             <a:r>
               <a:rPr lang="en-US" dirty="0" smtClean="0">
+                <a:solidFill>
+                  <a:schemeClr val="tx2"/>
+                </a:solidFill>
                 <a:latin typeface="Consolas" panose="020B0609020204030204" pitchFamily="49" charset="0"/>
                 <a:cs typeface="Consolas" panose="020B0609020204030204" pitchFamily="49" charset="0"/>
               </a:rPr>
@@ -3503,6 +3623,9 @@
             </a:r>
             <a:r>
               <a:rPr lang="en-US" dirty="0" smtClean="0">
+                <a:solidFill>
+                  <a:schemeClr val="tx2"/>
+                </a:solidFill>
                 <a:latin typeface="Consolas" panose="020B0609020204030204" pitchFamily="49" charset="0"/>
                 <a:cs typeface="Consolas" panose="020B0609020204030204" pitchFamily="49" charset="0"/>
                 <a:hlinkClick r:id="rId2"/>
@@ -3511,6 +3634,9 @@
             </a:r>
             <a:r>
               <a:rPr lang="en-US" dirty="0">
+                <a:solidFill>
+                  <a:schemeClr val="tx2"/>
+                </a:solidFill>
                 <a:latin typeface="Consolas" panose="020B0609020204030204" pitchFamily="49" charset="0"/>
                 <a:cs typeface="Consolas" panose="020B0609020204030204" pitchFamily="49" charset="0"/>
               </a:rPr>
@@ -3518,6 +3644,9 @@
             </a:r>
             <a:r>
               <a:rPr lang="en-US" dirty="0" smtClean="0">
+                <a:solidFill>
+                  <a:schemeClr val="tx2"/>
+                </a:solidFill>
                 <a:latin typeface="Consolas" panose="020B0609020204030204" pitchFamily="49" charset="0"/>
                 <a:cs typeface="Consolas" panose="020B0609020204030204" pitchFamily="49" charset="0"/>
               </a:rPr>
@@ -3581,18 +3710,34 @@
           <a:lstStyle/>
           <a:p>
             <a:r>
-              <a:rPr lang="en-US" sz="5400" dirty="0" err="1"/>
+              <a:rPr lang="en-US" sz="5400" dirty="0" err="1">
+                <a:solidFill>
+                  <a:schemeClr val="tx2"/>
+                </a:solidFill>
+              </a:rPr>
               <a:t>Config</a:t>
             </a:r>
             <a:r>
-              <a:rPr lang="en-US" sz="5400" dirty="0"/>
+              <a:rPr lang="en-US" sz="5400" dirty="0">
+                <a:solidFill>
+                  <a:schemeClr val="tx2"/>
+                </a:solidFill>
+              </a:rPr>
               <a:t> Options – </a:t>
             </a:r>
             <a:r>
-              <a:rPr lang="en-US" sz="5400" dirty="0" err="1"/>
+              <a:rPr lang="en-US" sz="5400" dirty="0" err="1">
+                <a:solidFill>
+                  <a:schemeClr val="tx2"/>
+                </a:solidFill>
+              </a:rPr>
               <a:t>singleRun</a:t>
             </a:r>
-            <a:endParaRPr lang="en-US" sz="5400" dirty="0"/>
+            <a:endParaRPr lang="en-US" sz="5400" dirty="0">
+              <a:solidFill>
+                <a:schemeClr val="tx2"/>
+              </a:solidFill>
+            </a:endParaRPr>
           </a:p>
         </p:txBody>
       </p:sp>
@@ -3614,19 +3759,35 @@
           <a:lstStyle/>
           <a:p>
             <a:r>
-              <a:rPr lang="en-US" sz="3600" dirty="0" smtClean="0"/>
+              <a:rPr lang="en-US" sz="3600" dirty="0" smtClean="0">
+                <a:solidFill>
+                  <a:schemeClr val="tx2"/>
+                </a:solidFill>
+              </a:rPr>
               <a:t>Integrate with CI (Jenkins, Travis, …)</a:t>
             </a:r>
           </a:p>
           <a:p>
-            <a:endParaRPr lang="en-US" sz="3600" dirty="0" smtClean="0"/>
-          </a:p>
-          <a:p>
-            <a:r>
-              <a:rPr lang="en-US" sz="3600" dirty="0" smtClean="0"/>
+            <a:endParaRPr lang="en-US" sz="3600" dirty="0" smtClean="0">
+              <a:solidFill>
+                <a:schemeClr val="tx2"/>
+              </a:solidFill>
+            </a:endParaRPr>
+          </a:p>
+          <a:p>
+            <a:r>
+              <a:rPr lang="en-US" sz="3600" dirty="0" smtClean="0">
+                <a:solidFill>
+                  <a:schemeClr val="tx2"/>
+                </a:solidFill>
+              </a:rPr>
               <a:t>Will run tests and set correct exit code</a:t>
             </a:r>
-            <a:endParaRPr lang="en-US" sz="3600" dirty="0"/>
+            <a:endParaRPr lang="en-US" sz="3600" dirty="0">
+              <a:solidFill>
+                <a:schemeClr val="tx2"/>
+              </a:solidFill>
+            </a:endParaRPr>
           </a:p>
         </p:txBody>
       </p:sp>
@@ -3685,10 +3846,18 @@
           <a:lstStyle/>
           <a:p>
             <a:r>
-              <a:rPr lang="en-US" sz="5400" dirty="0" smtClean="0"/>
+              <a:rPr lang="en-US" sz="5400" dirty="0" smtClean="0">
+                <a:solidFill>
+                  <a:schemeClr val="tx2"/>
+                </a:solidFill>
+              </a:rPr>
               <a:t>Grunt / Gulp Integration</a:t>
             </a:r>
-            <a:endParaRPr lang="en-US" sz="5400" dirty="0"/>
+            <a:endParaRPr lang="en-US" sz="5400" dirty="0">
+              <a:solidFill>
+                <a:schemeClr val="tx2"/>
+              </a:solidFill>
+            </a:endParaRPr>
           </a:p>
         </p:txBody>
       </p:sp>
@@ -3735,10 +3904,18 @@
           <a:p>
             <a:pPr algn="ctr"/>
             <a:r>
-              <a:rPr lang="en-US" sz="7200" dirty="0" smtClean="0"/>
+              <a:rPr lang="en-US" sz="7200" dirty="0" smtClean="0">
+                <a:solidFill>
+                  <a:schemeClr val="tx2"/>
+                </a:solidFill>
+              </a:rPr>
               <a:t>Demo</a:t>
             </a:r>
-            <a:endParaRPr lang="en-US" sz="7200" dirty="0"/>
+            <a:endParaRPr lang="en-US" sz="7200" dirty="0">
+              <a:solidFill>
+                <a:schemeClr val="tx2"/>
+              </a:solidFill>
+            </a:endParaRPr>
           </a:p>
         </p:txBody>
       </p:sp>
@@ -3822,10 +3999,18 @@
           <a:p>
             <a:pPr algn="ctr"/>
             <a:r>
-              <a:rPr lang="en-US" sz="7200" dirty="0" smtClean="0"/>
+              <a:rPr lang="en-US" sz="7200" dirty="0" smtClean="0">
+                <a:solidFill>
+                  <a:schemeClr val="tx2"/>
+                </a:solidFill>
+              </a:rPr>
               <a:t>Questions?</a:t>
             </a:r>
-            <a:endParaRPr lang="en-US" sz="7200" dirty="0"/>
+            <a:endParaRPr lang="en-US" sz="7200" dirty="0">
+              <a:solidFill>
+                <a:schemeClr val="tx2"/>
+              </a:solidFill>
+            </a:endParaRPr>
           </a:p>
         </p:txBody>
       </p:sp>
@@ -3884,10 +4069,18 @@
           <a:lstStyle/>
           <a:p>
             <a:r>
-              <a:rPr lang="en-US" sz="5400" dirty="0" smtClean="0"/>
+              <a:rPr lang="en-US" sz="5400" dirty="0" smtClean="0">
+                <a:solidFill>
+                  <a:schemeClr val="tx2"/>
+                </a:solidFill>
+              </a:rPr>
               <a:t>What is Karma?</a:t>
             </a:r>
-            <a:endParaRPr lang="en-US" sz="5400" dirty="0"/>
+            <a:endParaRPr lang="en-US" sz="5400" dirty="0">
+              <a:solidFill>
+                <a:schemeClr val="tx2"/>
+              </a:solidFill>
+            </a:endParaRPr>
           </a:p>
         </p:txBody>
       </p:sp>
@@ -3909,34 +4102,62 @@
           <a:lstStyle/>
           <a:p>
             <a:r>
-              <a:rPr lang="en-US" sz="3600" dirty="0" smtClean="0"/>
+              <a:rPr lang="en-US" sz="3600" dirty="0" smtClean="0">
+                <a:solidFill>
+                  <a:schemeClr val="tx2"/>
+                </a:solidFill>
+              </a:rPr>
               <a:t>Karma is a test runner </a:t>
             </a:r>
           </a:p>
           <a:p>
-            <a:endParaRPr lang="en-US" sz="3600" dirty="0" smtClean="0"/>
-          </a:p>
-          <a:p>
-            <a:r>
-              <a:rPr lang="en-US" sz="3600" dirty="0" smtClean="0"/>
+            <a:endParaRPr lang="en-US" sz="3600" dirty="0" smtClean="0">
+              <a:solidFill>
+                <a:schemeClr val="tx2"/>
+              </a:solidFill>
+            </a:endParaRPr>
+          </a:p>
+          <a:p>
+            <a:r>
+              <a:rPr lang="en-US" sz="3600" dirty="0" smtClean="0">
+                <a:solidFill>
+                  <a:schemeClr val="tx2"/>
+                </a:solidFill>
+              </a:rPr>
               <a:t>Created by the Angular team at Google</a:t>
             </a:r>
           </a:p>
           <a:p>
-            <a:endParaRPr lang="en-US" sz="3600" dirty="0" smtClean="0"/>
-          </a:p>
-          <a:p>
-            <a:r>
-              <a:rPr lang="en-US" sz="3600" dirty="0" smtClean="0"/>
+            <a:endParaRPr lang="en-US" sz="3600" dirty="0" smtClean="0">
+              <a:solidFill>
+                <a:schemeClr val="tx2"/>
+              </a:solidFill>
+            </a:endParaRPr>
+          </a:p>
+          <a:p>
+            <a:r>
+              <a:rPr lang="en-US" sz="3600" dirty="0" smtClean="0">
+                <a:solidFill>
+                  <a:schemeClr val="tx2"/>
+                </a:solidFill>
+              </a:rPr>
               <a:t>Designed to make unit testing simple</a:t>
             </a:r>
           </a:p>
           <a:p>
-            <a:endParaRPr lang="en-US" sz="3600" dirty="0" smtClean="0"/>
-          </a:p>
-          <a:p>
-            <a:r>
-              <a:rPr lang="en-US" sz="3600" dirty="0" smtClean="0"/>
+            <a:endParaRPr lang="en-US" sz="3600" dirty="0" smtClean="0">
+              <a:solidFill>
+                <a:schemeClr val="tx2"/>
+              </a:solidFill>
+            </a:endParaRPr>
+          </a:p>
+          <a:p>
+            <a:r>
+              <a:rPr lang="en-US" sz="3600" dirty="0" smtClean="0">
+                <a:solidFill>
+                  <a:schemeClr val="tx2"/>
+                </a:solidFill>
+              </a:rPr>
               <a:t>Designed to run in real browsers</a:t>
             </a:r>
           </a:p>
@@ -3997,10 +4218,18 @@
           <a:lstStyle/>
           <a:p>
             <a:r>
-              <a:rPr lang="en-US" sz="5400" dirty="0" smtClean="0"/>
+              <a:rPr lang="en-US" sz="5400" dirty="0" smtClean="0">
+                <a:solidFill>
+                  <a:schemeClr val="tx2"/>
+                </a:solidFill>
+              </a:rPr>
               <a:t>Getting Started</a:t>
             </a:r>
-            <a:endParaRPr lang="en-US" sz="5400" dirty="0"/>
+            <a:endParaRPr lang="en-US" sz="5400" dirty="0">
+              <a:solidFill>
+                <a:schemeClr val="tx2"/>
+              </a:solidFill>
+            </a:endParaRPr>
           </a:p>
         </p:txBody>
       </p:sp>
@@ -4030,21 +4259,21 @@
               <a:buNone/>
             </a:pPr>
             <a:r>
-              <a:rPr lang="en-US" sz="3600" dirty="0" err="1">
+              <a:rPr lang="en-US" sz="3600" b="1" dirty="0" err="1">
                 <a:latin typeface="Consolas" panose="020B0609020204030204" pitchFamily="49" charset="0"/>
                 <a:cs typeface="Consolas" panose="020B0609020204030204" pitchFamily="49" charset="0"/>
               </a:rPr>
               <a:t>npm</a:t>
             </a:r>
             <a:r>
-              <a:rPr lang="en-US" sz="3600" dirty="0">
+              <a:rPr lang="en-US" sz="3600" b="1" dirty="0">
                 <a:latin typeface="Consolas" panose="020B0609020204030204" pitchFamily="49" charset="0"/>
                 <a:cs typeface="Consolas" panose="020B0609020204030204" pitchFamily="49" charset="0"/>
               </a:rPr>
               <a:t> install -g </a:t>
             </a:r>
             <a:r>
-              <a:rPr lang="en-US" sz="3600" dirty="0" smtClean="0">
+              <a:rPr lang="en-US" sz="3600" b="1" dirty="0" smtClean="0">
                 <a:latin typeface="Consolas" panose="020B0609020204030204" pitchFamily="49" charset="0"/>
                 <a:cs typeface="Consolas" panose="020B0609020204030204" pitchFamily="49" charset="0"/>
               </a:rPr>
@@ -4056,49 +4285,42 @@
               <a:buNone/>
             </a:pPr>
             <a:r>
-              <a:rPr lang="en-US" sz="3600" dirty="0" err="1" smtClean="0">
+              <a:rPr lang="en-US" sz="3600" b="1" dirty="0" err="1" smtClean="0">
                 <a:latin typeface="Consolas" panose="020B0609020204030204" pitchFamily="49" charset="0"/>
                 <a:cs typeface="Consolas" panose="020B0609020204030204" pitchFamily="49" charset="0"/>
               </a:rPr>
               <a:t>npm</a:t>
             </a:r>
             <a:r>
-              <a:rPr lang="en-US" sz="3600" dirty="0" smtClean="0">
+              <a:rPr lang="en-US" sz="3600" b="1" dirty="0" smtClean="0">
                 <a:latin typeface="Consolas" panose="020B0609020204030204" pitchFamily="49" charset="0"/>
                 <a:cs typeface="Consolas" panose="020B0609020204030204" pitchFamily="49" charset="0"/>
               </a:rPr>
-              <a:t> </a:t>
-            </a:r>
-            <a:r>
-              <a:rPr lang="en-US" sz="3600" dirty="0" smtClean="0">
+              <a:t> install -g karma-cli</a:t>
+            </a:r>
+          </a:p>
+          <a:p>
+            <a:endParaRPr lang="en-US" sz="3600" b="1" dirty="0" smtClean="0"/>
+          </a:p>
+          <a:p>
+            <a:pPr marL="0" indent="0">
+              <a:buNone/>
+            </a:pPr>
+            <a:r>
+              <a:rPr lang="en-US" sz="3600" b="1" dirty="0" smtClean="0">
                 <a:latin typeface="Consolas" panose="020B0609020204030204" pitchFamily="49" charset="0"/>
                 <a:cs typeface="Consolas" panose="020B0609020204030204" pitchFamily="49" charset="0"/>
               </a:rPr>
-              <a:t>install -g karma-cli</a:t>
-            </a:r>
-          </a:p>
-          <a:p>
-            <a:endParaRPr lang="en-US" sz="3600" dirty="0" smtClean="0"/>
-          </a:p>
-          <a:p>
-            <a:pPr marL="0" indent="0">
-              <a:buNone/>
-            </a:pPr>
-            <a:r>
-              <a:rPr lang="en-US" sz="3600" dirty="0" smtClean="0">
+              <a:t>karma </a:t>
+            </a:r>
+            <a:r>
+              <a:rPr lang="en-US" sz="3600" b="1" dirty="0" err="1" smtClean="0">
                 <a:latin typeface="Consolas" panose="020B0609020204030204" pitchFamily="49" charset="0"/>
                 <a:cs typeface="Consolas" panose="020B0609020204030204" pitchFamily="49" charset="0"/>
               </a:rPr>
-              <a:t>karma </a:t>
-            </a:r>
-            <a:r>
-              <a:rPr lang="en-US" sz="3600" dirty="0" err="1" smtClean="0">
-                <a:latin typeface="Consolas" panose="020B0609020204030204" pitchFamily="49" charset="0"/>
-                <a:cs typeface="Consolas" panose="020B0609020204030204" pitchFamily="49" charset="0"/>
-              </a:rPr>
               <a:t>init</a:t>
             </a:r>
-            <a:endParaRPr lang="en-US" sz="3600" dirty="0" smtClean="0">
+            <a:endParaRPr lang="en-US" sz="3600" b="1" dirty="0" smtClean="0">
               <a:latin typeface="Consolas" panose="020B0609020204030204" pitchFamily="49" charset="0"/>
               <a:cs typeface="Consolas" panose="020B0609020204030204" pitchFamily="49" charset="0"/>
             </a:endParaRPr>
@@ -4108,10 +4330,22 @@
           </a:p>
           <a:p>
             <a:r>
-              <a:rPr lang="en-US" sz="3600" dirty="0" smtClean="0"/>
+              <a:rPr lang="en-US" sz="3600" dirty="0" smtClean="0">
+                <a:solidFill>
+                  <a:schemeClr val="tx2"/>
+                </a:solidFill>
+                <a:ea typeface="Arial Unicode MS" panose="020B0604020202020204" pitchFamily="34" charset="-128"/>
+                <a:cs typeface="Arial Unicode MS" panose="020B0604020202020204" pitchFamily="34" charset="-128"/>
+              </a:rPr>
               <a:t>Karma will step through the configuration</a:t>
             </a:r>
-            <a:endParaRPr lang="en-US" sz="3600" dirty="0"/>
+            <a:endParaRPr lang="en-US" sz="3600" dirty="0">
+              <a:solidFill>
+                <a:schemeClr val="tx2"/>
+              </a:solidFill>
+              <a:ea typeface="Arial Unicode MS" panose="020B0604020202020204" pitchFamily="34" charset="-128"/>
+              <a:cs typeface="Arial Unicode MS" panose="020B0604020202020204" pitchFamily="34" charset="-128"/>
+            </a:endParaRPr>
           </a:p>
         </p:txBody>
       </p:sp>
@@ -4176,10 +4410,18 @@
           <a:p>
             <a:pPr algn="ctr"/>
             <a:r>
-              <a:rPr lang="en-US" sz="7200" dirty="0" smtClean="0"/>
+              <a:rPr lang="en-US" sz="7200" dirty="0" smtClean="0">
+                <a:solidFill>
+                  <a:schemeClr val="tx2"/>
+                </a:solidFill>
+              </a:rPr>
               <a:t>Demo</a:t>
             </a:r>
-            <a:endParaRPr lang="en-US" sz="7200" dirty="0"/>
+            <a:endParaRPr lang="en-US" sz="7200" dirty="0">
+              <a:solidFill>
+                <a:schemeClr val="tx2"/>
+              </a:solidFill>
+            </a:endParaRPr>
           </a:p>
         </p:txBody>
       </p:sp>
@@ -4238,11 +4480,19 @@
           <a:lstStyle/>
           <a:p>
             <a:r>
-              <a:rPr lang="en-US" sz="5400" dirty="0" err="1"/>
+              <a:rPr lang="en-US" sz="5400" dirty="0" err="1">
+                <a:solidFill>
+                  <a:schemeClr val="tx2"/>
+                </a:solidFill>
+              </a:rPr>
               <a:t>Config</a:t>
             </a:r>
             <a:r>
-              <a:rPr lang="en-US" sz="5400" dirty="0"/>
+              <a:rPr lang="en-US" sz="5400" dirty="0">
+                <a:solidFill>
+                  <a:schemeClr val="tx2"/>
+                </a:solidFill>
+              </a:rPr>
               <a:t> Options – frameworks</a:t>
             </a:r>
           </a:p>
@@ -4271,71 +4521,135 @@
           <a:lstStyle/>
           <a:p>
             <a:r>
-              <a:rPr lang="en-US" sz="3600" dirty="0" smtClean="0"/>
+              <a:rPr lang="en-US" sz="3600" dirty="0" smtClean="0">
+                <a:solidFill>
+                  <a:schemeClr val="tx2"/>
+                </a:solidFill>
+              </a:rPr>
               <a:t>Works with </a:t>
             </a:r>
             <a:r>
-              <a:rPr lang="en-US" sz="3600" dirty="0"/>
+              <a:rPr lang="en-US" sz="3600" dirty="0">
+                <a:solidFill>
+                  <a:schemeClr val="tx2"/>
+                </a:solidFill>
+              </a:rPr>
               <a:t>your favorite test framework</a:t>
             </a:r>
           </a:p>
           <a:p>
             <a:pPr lvl="1"/>
             <a:r>
-              <a:rPr lang="en-US" sz="3600" dirty="0" smtClean="0"/>
+              <a:rPr lang="en-US" sz="3600" dirty="0" smtClean="0">
+                <a:solidFill>
+                  <a:schemeClr val="tx2"/>
+                </a:solidFill>
+              </a:rPr>
               <a:t>Jasmine, </a:t>
             </a:r>
             <a:r>
-              <a:rPr lang="en-US" sz="3600" dirty="0" err="1" smtClean="0"/>
+              <a:rPr lang="en-US" sz="3600" dirty="0" err="1" smtClean="0">
+                <a:solidFill>
+                  <a:schemeClr val="tx2"/>
+                </a:solidFill>
+              </a:rPr>
               <a:t>QUnit</a:t>
             </a:r>
             <a:r>
-              <a:rPr lang="en-US" sz="3600" dirty="0" smtClean="0"/>
+              <a:rPr lang="en-US" sz="3600" dirty="0" smtClean="0">
+                <a:solidFill>
+                  <a:schemeClr val="tx2"/>
+                </a:solidFill>
+              </a:rPr>
               <a:t>, Mocha, …</a:t>
             </a:r>
           </a:p>
           <a:p>
             <a:pPr lvl="1"/>
-            <a:endParaRPr lang="en-US" sz="3600" dirty="0" smtClean="0"/>
+            <a:endParaRPr lang="en-US" sz="3600" dirty="0" smtClean="0">
+              <a:solidFill>
+                <a:schemeClr val="tx2"/>
+              </a:solidFill>
+            </a:endParaRPr>
           </a:p>
           <a:p>
             <a:pPr lvl="1"/>
-            <a:endParaRPr lang="en-US" sz="3600" dirty="0"/>
-          </a:p>
-          <a:p>
-            <a:r>
-              <a:rPr lang="en-US" sz="3600" dirty="0" smtClean="0"/>
+            <a:endParaRPr lang="en-US" sz="3600" dirty="0">
+              <a:solidFill>
+                <a:schemeClr val="tx2"/>
+              </a:solidFill>
+            </a:endParaRPr>
+          </a:p>
+          <a:p>
+            <a:r>
+              <a:rPr lang="en-US" sz="3600" dirty="0" smtClean="0">
+                <a:solidFill>
+                  <a:schemeClr val="tx2"/>
+                </a:solidFill>
+              </a:rPr>
               <a:t>Plugins for module loaders </a:t>
             </a:r>
           </a:p>
           <a:p>
-            <a:endParaRPr lang="en-US" sz="3600" dirty="0" smtClean="0"/>
-          </a:p>
-          <a:p>
-            <a:endParaRPr lang="en-US" sz="3600" dirty="0"/>
-          </a:p>
-          <a:p>
-            <a:r>
-              <a:rPr lang="en-US" sz="3600" dirty="0" smtClean="0"/>
+            <a:endParaRPr lang="en-US" sz="3600" dirty="0" smtClean="0">
+              <a:solidFill>
+                <a:schemeClr val="tx2"/>
+              </a:solidFill>
+            </a:endParaRPr>
+          </a:p>
+          <a:p>
+            <a:endParaRPr lang="en-US" sz="3600" dirty="0">
+              <a:solidFill>
+                <a:schemeClr val="tx2"/>
+              </a:solidFill>
+            </a:endParaRPr>
+          </a:p>
+          <a:p>
+            <a:r>
+              <a:rPr lang="en-US" sz="3600" dirty="0" smtClean="0">
+                <a:solidFill>
+                  <a:schemeClr val="tx2"/>
+                </a:solidFill>
+              </a:rPr>
               <a:t>Plugins like jasmine-</a:t>
             </a:r>
             <a:r>
-              <a:rPr lang="en-US" sz="3600" dirty="0" err="1" smtClean="0"/>
+              <a:rPr lang="en-US" sz="3600" dirty="0" err="1" smtClean="0">
+                <a:solidFill>
+                  <a:schemeClr val="tx2"/>
+                </a:solidFill>
+              </a:rPr>
               <a:t>ajax</a:t>
             </a:r>
             <a:r>
-              <a:rPr lang="en-US" sz="3600" dirty="0" smtClean="0"/>
+              <a:rPr lang="en-US" sz="3600" dirty="0" smtClean="0">
+                <a:solidFill>
+                  <a:schemeClr val="tx2"/>
+                </a:solidFill>
+              </a:rPr>
               <a:t>, jasmine-</a:t>
             </a:r>
             <a:r>
-              <a:rPr lang="en-US" sz="3600" dirty="0" err="1" smtClean="0"/>
+              <a:rPr lang="en-US" sz="3600" dirty="0" err="1" smtClean="0">
+                <a:solidFill>
+                  <a:schemeClr val="tx2"/>
+                </a:solidFill>
+              </a:rPr>
               <a:t>jquery</a:t>
             </a:r>
             <a:r>
-              <a:rPr lang="en-US" sz="3600" dirty="0" smtClean="0"/>
+              <a:rPr lang="en-US" sz="3600" dirty="0" smtClean="0">
+                <a:solidFill>
+                  <a:schemeClr val="tx2"/>
+                </a:solidFill>
+              </a:rPr>
               <a:t>, many more</a:t>
             </a:r>
-            <a:endParaRPr lang="en-US" sz="3600" dirty="0"/>
+            <a:endParaRPr lang="en-US" sz="3600" dirty="0">
+              <a:solidFill>
+                <a:schemeClr val="tx2"/>
+              </a:solidFill>
+            </a:endParaRPr>
           </a:p>
         </p:txBody>
       </p:sp>
@@ -4394,18 +4708,34 @@
           <a:lstStyle/>
           <a:p>
             <a:r>
-              <a:rPr lang="en-US" sz="5400" dirty="0" err="1"/>
+              <a:rPr lang="en-US" sz="5400" dirty="0" err="1">
+                <a:solidFill>
+                  <a:schemeClr val="tx2"/>
+                </a:solidFill>
+              </a:rPr>
               <a:t>Config</a:t>
             </a:r>
             <a:r>
-              <a:rPr lang="en-US" sz="5400" dirty="0"/>
+              <a:rPr lang="en-US" sz="5400" dirty="0">
+                <a:solidFill>
+                  <a:schemeClr val="tx2"/>
+                </a:solidFill>
+              </a:rPr>
               <a:t> Options – </a:t>
             </a:r>
             <a:r>
-              <a:rPr lang="en-US" sz="5400" dirty="0" smtClean="0"/>
+              <a:rPr lang="en-US" sz="5400" dirty="0" smtClean="0">
+                <a:solidFill>
+                  <a:schemeClr val="tx2"/>
+                </a:solidFill>
+              </a:rPr>
               <a:t>files</a:t>
             </a:r>
-            <a:endParaRPr lang="en-US" sz="5400" dirty="0"/>
+            <a:endParaRPr lang="en-US" sz="5400" dirty="0">
+              <a:solidFill>
+                <a:schemeClr val="tx2"/>
+              </a:solidFill>
+            </a:endParaRPr>
           </a:p>
         </p:txBody>
       </p:sp>
@@ -4430,55 +4760,92 @@
               <a:buNone/>
             </a:pPr>
             <a:r>
-              <a:rPr lang="en-US" sz="2400" dirty="0">
+              <a:rPr lang="en-US" sz="2400" b="1" dirty="0" smtClean="0">
                 <a:latin typeface="Consolas" panose="020B0609020204030204" pitchFamily="49" charset="0"/>
                 <a:cs typeface="Consolas" panose="020B0609020204030204" pitchFamily="49" charset="0"/>
               </a:rPr>
-              <a:t>{</a:t>
+              <a:t>{ </a:t>
+            </a:r>
+            <a:r>
+              <a:rPr lang="en-US" sz="2400" b="1" dirty="0" smtClean="0">
+                <a:solidFill>
+                  <a:srgbClr val="FF0000"/>
+                </a:solidFill>
+                <a:latin typeface="Consolas" panose="020B0609020204030204" pitchFamily="49" charset="0"/>
+                <a:cs typeface="Consolas" panose="020B0609020204030204" pitchFamily="49" charset="0"/>
+              </a:rPr>
+              <a:t>pattern</a:t>
             </a:r>
             <a:r>
               <a:rPr lang="en-US" sz="2400" b="1" dirty="0">
                 <a:latin typeface="Consolas" panose="020B0609020204030204" pitchFamily="49" charset="0"/>
                 <a:cs typeface="Consolas" panose="020B0609020204030204" pitchFamily="49" charset="0"/>
               </a:rPr>
-              <a:t>pattern</a:t>
-            </a:r>
-            <a:r>
-              <a:rPr lang="en-US" sz="2400" dirty="0">
+              <a:t>, watched: true, included: true, served: </a:t>
+            </a:r>
+            <a:r>
+              <a:rPr lang="en-US" sz="2400" b="1" dirty="0" smtClean="0">
                 <a:latin typeface="Consolas" panose="020B0609020204030204" pitchFamily="49" charset="0"/>
                 <a:cs typeface="Consolas" panose="020B0609020204030204" pitchFamily="49" charset="0"/>
               </a:rPr>
-              <a:t>, watched: true, included: true, served: true}</a:t>
-            </a:r>
+              <a:t>true }</a:t>
+            </a:r>
+            <a:endParaRPr lang="en-US" sz="2400" b="1" dirty="0">
+              <a:latin typeface="Consolas" panose="020B0609020204030204" pitchFamily="49" charset="0"/>
+              <a:cs typeface="Consolas" panose="020B0609020204030204" pitchFamily="49" charset="0"/>
+            </a:endParaRPr>
           </a:p>
           <a:p>
             <a:endParaRPr lang="en-US" sz="3600" dirty="0"/>
           </a:p>
           <a:p>
             <a:r>
-              <a:rPr lang="en-US" sz="3600" dirty="0" smtClean="0"/>
+              <a:rPr lang="en-US" sz="3600" dirty="0" smtClean="0">
+                <a:solidFill>
+                  <a:schemeClr val="tx2"/>
+                </a:solidFill>
+              </a:rPr>
               <a:t>Uses </a:t>
             </a:r>
             <a:r>
               <a:rPr lang="en-US" sz="3600" dirty="0" smtClean="0">
+                <a:solidFill>
+                  <a:schemeClr val="tx2"/>
+                </a:solidFill>
                 <a:hlinkClick r:id="rId2"/>
               </a:rPr>
               <a:t>node-glob</a:t>
             </a:r>
             <a:r>
-              <a:rPr lang="en-US" sz="3600" dirty="0" smtClean="0"/>
+              <a:rPr lang="en-US" sz="3600" dirty="0" smtClean="0">
+                <a:solidFill>
+                  <a:schemeClr val="tx2"/>
+                </a:solidFill>
+              </a:rPr>
               <a:t> to match file patterns</a:t>
             </a:r>
           </a:p>
           <a:p>
-            <a:endParaRPr lang="en-US" sz="3600" dirty="0"/>
-          </a:p>
-          <a:p>
-            <a:r>
-              <a:rPr lang="en-US" sz="3600" dirty="0" smtClean="0"/>
+            <a:endParaRPr lang="en-US" sz="3600" dirty="0">
+              <a:solidFill>
+                <a:schemeClr val="tx2"/>
+              </a:solidFill>
+            </a:endParaRPr>
+          </a:p>
+          <a:p>
+            <a:r>
+              <a:rPr lang="en-US" sz="3600" dirty="0" smtClean="0">
+                <a:solidFill>
+                  <a:schemeClr val="tx2"/>
+                </a:solidFill>
+              </a:rPr>
               <a:t>No need to update when adding new files</a:t>
             </a:r>
-            <a:endParaRPr lang="en-US" sz="3600" dirty="0"/>
+            <a:endParaRPr lang="en-US" sz="3600" dirty="0">
+              <a:solidFill>
+                <a:schemeClr val="tx2"/>
+              </a:solidFill>
+            </a:endParaRPr>
           </a:p>
         </p:txBody>
       </p:sp>
@@ -4537,18 +4904,42 @@
           <a:lstStyle/>
           <a:p>
             <a:r>
-              <a:rPr lang="en-US" sz="5400" dirty="0" err="1"/>
+              <a:rPr lang="en-US" sz="5400" dirty="0" err="1">
+                <a:solidFill>
+                  <a:schemeClr val="tx2"/>
+                </a:solidFill>
+              </a:rPr>
               <a:t>Config</a:t>
             </a:r>
             <a:r>
-              <a:rPr lang="en-US" sz="5400" dirty="0"/>
+              <a:rPr lang="en-US" sz="5400" dirty="0">
+                <a:solidFill>
+                  <a:schemeClr val="tx2"/>
+                </a:solidFill>
+              </a:rPr>
               <a:t> Options </a:t>
             </a:r>
             <a:r>
-              <a:rPr lang="en-US" sz="5400" dirty="0" smtClean="0"/>
-              <a:t>– files (cont.)</a:t>
-            </a:r>
-            <a:endParaRPr lang="en-US" sz="5400" dirty="0"/>
+              <a:rPr lang="en-US" sz="5400" dirty="0" smtClean="0">
+                <a:solidFill>
+                  <a:schemeClr val="tx2"/>
+                </a:solidFill>
+              </a:rPr>
+              <a:t>– </a:t>
+            </a:r>
+            <a:r>
+              <a:rPr lang="en-US" sz="5400" dirty="0" smtClean="0">
+                <a:solidFill>
+                  <a:schemeClr val="tx2"/>
+                </a:solidFill>
+              </a:rPr>
+              <a:t>files</a:t>
+            </a:r>
+            <a:endParaRPr lang="en-US" sz="5400" dirty="0">
+              <a:solidFill>
+                <a:schemeClr val="tx2"/>
+              </a:solidFill>
+            </a:endParaRPr>
           </a:p>
         </p:txBody>
       </p:sp>
@@ -4576,26 +4967,47 @@
               <a:buNone/>
             </a:pPr>
             <a:r>
-              <a:rPr lang="en-US" sz="2400" dirty="0" smtClean="0">
-                <a:latin typeface="Consolas" panose="020B0609020204030204" pitchFamily="49" charset="0"/>
-                <a:cs typeface="Consolas" panose="020B0609020204030204" pitchFamily="49" charset="0"/>
-              </a:rPr>
-              <a:t>{pattern, </a:t>
-            </a:r>
-            <a:r>
               <a:rPr lang="en-US" sz="2400" b="1" dirty="0" smtClean="0">
                 <a:latin typeface="Consolas" panose="020B0609020204030204" pitchFamily="49" charset="0"/>
                 <a:cs typeface="Consolas" panose="020B0609020204030204" pitchFamily="49" charset="0"/>
               </a:rPr>
-              <a:t>watched: true</a:t>
-            </a:r>
-            <a:r>
-              <a:rPr lang="en-US" sz="2400" dirty="0" smtClean="0">
+              <a:t>{ pattern</a:t>
+            </a:r>
+            <a:r>
+              <a:rPr lang="en-US" sz="2400" b="1" dirty="0" smtClean="0">
                 <a:latin typeface="Consolas" panose="020B0609020204030204" pitchFamily="49" charset="0"/>
                 <a:cs typeface="Consolas" panose="020B0609020204030204" pitchFamily="49" charset="0"/>
               </a:rPr>
-              <a:t>, included: true, served: true}</a:t>
-            </a:r>
+              <a:t>, </a:t>
+            </a:r>
+            <a:r>
+              <a:rPr lang="en-US" sz="2400" b="1" dirty="0" smtClean="0">
+                <a:solidFill>
+                  <a:srgbClr val="FF0000"/>
+                </a:solidFill>
+                <a:latin typeface="Consolas" panose="020B0609020204030204" pitchFamily="49" charset="0"/>
+                <a:cs typeface="Consolas" panose="020B0609020204030204" pitchFamily="49" charset="0"/>
+              </a:rPr>
+              <a:t>watched: true</a:t>
+            </a:r>
+            <a:r>
+              <a:rPr lang="en-US" sz="2400" b="1" dirty="0" smtClean="0">
+                <a:latin typeface="Consolas" panose="020B0609020204030204" pitchFamily="49" charset="0"/>
+                <a:cs typeface="Consolas" panose="020B0609020204030204" pitchFamily="49" charset="0"/>
+              </a:rPr>
+              <a:t>, included: true, served: </a:t>
+            </a:r>
+            <a:r>
+              <a:rPr lang="en-US" sz="2400" b="1" dirty="0" smtClean="0">
+                <a:latin typeface="Consolas" panose="020B0609020204030204" pitchFamily="49" charset="0"/>
+                <a:cs typeface="Consolas" panose="020B0609020204030204" pitchFamily="49" charset="0"/>
+              </a:rPr>
+              <a:t>true }</a:t>
+            </a:r>
+            <a:endParaRPr lang="en-US" sz="2400" b="1" dirty="0" smtClean="0">
+              <a:latin typeface="Consolas" panose="020B0609020204030204" pitchFamily="49" charset="0"/>
+              <a:cs typeface="Consolas" panose="020B0609020204030204" pitchFamily="49" charset="0"/>
+            </a:endParaRPr>
           </a:p>
           <a:p>
             <a:pPr marL="0" indent="0">
@@ -4605,27 +5017,46 @@
           </a:p>
           <a:p>
             <a:r>
-              <a:rPr lang="en-US" sz="3600" dirty="0" smtClean="0"/>
+              <a:rPr lang="en-US" sz="3600" dirty="0" smtClean="0">
+                <a:solidFill>
+                  <a:schemeClr val="tx2"/>
+                </a:solidFill>
+              </a:rPr>
               <a:t>works with </a:t>
             </a:r>
             <a:r>
               <a:rPr lang="en-US" sz="3600" dirty="0" err="1" smtClean="0">
+                <a:solidFill>
+                  <a:schemeClr val="tx2"/>
+                </a:solidFill>
                 <a:latin typeface="Consolas" panose="020B0609020204030204" pitchFamily="49" charset="0"/>
                 <a:cs typeface="Consolas" panose="020B0609020204030204" pitchFamily="49" charset="0"/>
               </a:rPr>
               <a:t>autoWatch</a:t>
             </a:r>
             <a:r>
-              <a:rPr lang="en-US" sz="3600" dirty="0" smtClean="0"/>
+              <a:rPr lang="en-US" sz="3600" dirty="0" smtClean="0">
+                <a:solidFill>
+                  <a:schemeClr val="tx2"/>
+                </a:solidFill>
+              </a:rPr>
               <a:t> option</a:t>
             </a:r>
           </a:p>
           <a:p>
-            <a:endParaRPr lang="en-US" sz="3600" dirty="0"/>
-          </a:p>
-          <a:p>
-            <a:r>
-              <a:rPr lang="en-US" sz="3600" dirty="0" smtClean="0"/>
+            <a:endParaRPr lang="en-US" sz="3600" dirty="0">
+              <a:solidFill>
+                <a:schemeClr val="tx2"/>
+              </a:solidFill>
+            </a:endParaRPr>
+          </a:p>
+          <a:p>
+            <a:r>
+              <a:rPr lang="en-US" sz="3600" dirty="0" smtClean="0">
+                <a:solidFill>
+                  <a:schemeClr val="tx2"/>
+                </a:solidFill>
+              </a:rPr>
               <a:t>karma will watch files and rerun tests on save</a:t>
             </a:r>
           </a:p>
@@ -4686,13 +5117,34 @@
           <a:lstStyle/>
           <a:p>
             <a:r>
-              <a:rPr lang="en-US" sz="5400" dirty="0" err="1"/>
+              <a:rPr lang="en-US" sz="5400" dirty="0" err="1">
+                <a:solidFill>
+                  <a:schemeClr val="tx2"/>
+                </a:solidFill>
+              </a:rPr>
               <a:t>Config</a:t>
             </a:r>
             <a:r>
-              <a:rPr lang="en-US" sz="5400" dirty="0"/>
-              <a:t> Options – files (cont.)</a:t>
-            </a:r>
+              <a:rPr lang="en-US" sz="5400" dirty="0">
+                <a:solidFill>
+                  <a:schemeClr val="tx2"/>
+                </a:solidFill>
+              </a:rPr>
+              <a:t> Options – </a:t>
+            </a:r>
+            <a:r>
+              <a:rPr lang="en-US" sz="5400" dirty="0" smtClean="0">
+                <a:solidFill>
+                  <a:schemeClr val="tx2"/>
+                </a:solidFill>
+              </a:rPr>
+              <a:t>files</a:t>
+            </a:r>
+            <a:endParaRPr lang="en-US" sz="5400" dirty="0">
+              <a:solidFill>
+                <a:schemeClr val="tx2"/>
+              </a:solidFill>
+            </a:endParaRPr>
           </a:p>
         </p:txBody>
       </p:sp>
@@ -4720,26 +5172,47 @@
               <a:buNone/>
             </a:pPr>
             <a:r>
-              <a:rPr lang="en-US" sz="2400" dirty="0" smtClean="0">
-                <a:latin typeface="Consolas" panose="020B0609020204030204" pitchFamily="49" charset="0"/>
-                <a:cs typeface="Consolas" panose="020B0609020204030204" pitchFamily="49" charset="0"/>
-              </a:rPr>
-              <a:t>{pattern, watched: true, </a:t>
-            </a:r>
-            <a:r>
               <a:rPr lang="en-US" sz="2400" b="1" dirty="0" smtClean="0">
                 <a:latin typeface="Consolas" panose="020B0609020204030204" pitchFamily="49" charset="0"/>
                 <a:cs typeface="Consolas" panose="020B0609020204030204" pitchFamily="49" charset="0"/>
               </a:rPr>
-              <a:t>included: true</a:t>
-            </a:r>
-            <a:r>
-              <a:rPr lang="en-US" sz="2400" dirty="0" smtClean="0">
+              <a:t>{ pattern</a:t>
+            </a:r>
+            <a:r>
+              <a:rPr lang="en-US" sz="2400" b="1" dirty="0" smtClean="0">
                 <a:latin typeface="Consolas" panose="020B0609020204030204" pitchFamily="49" charset="0"/>
                 <a:cs typeface="Consolas" panose="020B0609020204030204" pitchFamily="49" charset="0"/>
               </a:rPr>
-              <a:t>, served: true}</a:t>
-            </a:r>
+              <a:t>, watched: true, </a:t>
+            </a:r>
+            <a:r>
+              <a:rPr lang="en-US" sz="2400" b="1" dirty="0" smtClean="0">
+                <a:solidFill>
+                  <a:srgbClr val="FF0000"/>
+                </a:solidFill>
+                <a:latin typeface="Consolas" panose="020B0609020204030204" pitchFamily="49" charset="0"/>
+                <a:cs typeface="Consolas" panose="020B0609020204030204" pitchFamily="49" charset="0"/>
+              </a:rPr>
+              <a:t>included: true</a:t>
+            </a:r>
+            <a:r>
+              <a:rPr lang="en-US" sz="2400" b="1" dirty="0" smtClean="0">
+                <a:latin typeface="Consolas" panose="020B0609020204030204" pitchFamily="49" charset="0"/>
+                <a:cs typeface="Consolas" panose="020B0609020204030204" pitchFamily="49" charset="0"/>
+              </a:rPr>
+              <a:t>, served: </a:t>
+            </a:r>
+            <a:r>
+              <a:rPr lang="en-US" sz="2400" b="1" dirty="0" smtClean="0">
+                <a:latin typeface="Consolas" panose="020B0609020204030204" pitchFamily="49" charset="0"/>
+                <a:cs typeface="Consolas" panose="020B0609020204030204" pitchFamily="49" charset="0"/>
+              </a:rPr>
+              <a:t>true }</a:t>
+            </a:r>
+            <a:endParaRPr lang="en-US" sz="2400" b="1" dirty="0" smtClean="0">
+              <a:latin typeface="Consolas" panose="020B0609020204030204" pitchFamily="49" charset="0"/>
+              <a:cs typeface="Consolas" panose="020B0609020204030204" pitchFamily="49" charset="0"/>
+            </a:endParaRPr>
           </a:p>
           <a:p>
             <a:pPr marL="0" indent="0">
@@ -4749,35 +5222,67 @@
           </a:p>
           <a:p>
             <a:r>
-              <a:rPr lang="en-US" sz="3600" dirty="0" smtClean="0"/>
+              <a:rPr lang="en-US" sz="3600" dirty="0" smtClean="0">
+                <a:solidFill>
+                  <a:schemeClr val="tx2"/>
+                </a:solidFill>
+              </a:rPr>
               <a:t>Karma will include file in a &lt;script&gt; tag</a:t>
             </a:r>
           </a:p>
           <a:p>
-            <a:endParaRPr lang="en-US" sz="3600" dirty="0" smtClean="0"/>
-          </a:p>
-          <a:p>
-            <a:r>
-              <a:rPr lang="en-US" sz="3600" dirty="0"/>
+            <a:endParaRPr lang="en-US" sz="3600" dirty="0" smtClean="0">
+              <a:solidFill>
+                <a:schemeClr val="tx2"/>
+              </a:solidFill>
+            </a:endParaRPr>
+          </a:p>
+          <a:p>
+            <a:r>
+              <a:rPr lang="en-US" sz="3600" dirty="0">
+                <a:solidFill>
+                  <a:schemeClr val="tx2"/>
+                </a:solidFill>
+              </a:rPr>
               <a:t>S</a:t>
             </a:r>
             <a:r>
-              <a:rPr lang="en-US" sz="3600" dirty="0" smtClean="0"/>
+              <a:rPr lang="en-US" sz="3600" dirty="0" smtClean="0">
+                <a:solidFill>
+                  <a:schemeClr val="tx2"/>
+                </a:solidFill>
+              </a:rPr>
               <a:t>et to false if you’re using </a:t>
             </a:r>
             <a:r>
-              <a:rPr lang="en-US" sz="3600" dirty="0" err="1" smtClean="0"/>
+              <a:rPr lang="en-US" sz="3600" dirty="0" err="1" smtClean="0">
+                <a:solidFill>
+                  <a:schemeClr val="tx2"/>
+                </a:solidFill>
+              </a:rPr>
               <a:t>RequireJS</a:t>
             </a:r>
             <a:r>
-              <a:rPr lang="en-US" sz="3600" dirty="0" smtClean="0"/>
+              <a:rPr lang="en-US" sz="3600" dirty="0" smtClean="0">
+                <a:solidFill>
+                  <a:schemeClr val="tx2"/>
+                </a:solidFill>
+              </a:rPr>
               <a:t> or </a:t>
             </a:r>
             <a:r>
-              <a:rPr lang="en-US" sz="3600" dirty="0" err="1" smtClean="0"/>
+              <a:rPr lang="en-US" sz="3600" dirty="0" err="1" smtClean="0">
+                <a:solidFill>
+                  <a:schemeClr val="tx2"/>
+                </a:solidFill>
+              </a:rPr>
               <a:t>CommonJS</a:t>
             </a:r>
-            <a:endParaRPr lang="en-US" sz="3600" dirty="0" smtClean="0"/>
+            <a:endParaRPr lang="en-US" sz="3600" dirty="0" smtClean="0">
+              <a:solidFill>
+                <a:schemeClr val="tx2"/>
+              </a:solidFill>
+            </a:endParaRPr>
           </a:p>
         </p:txBody>
       </p:sp>
@@ -4836,13 +5341,34 @@
           <a:lstStyle/>
           <a:p>
             <a:r>
-              <a:rPr lang="en-US" sz="5400" dirty="0" err="1"/>
+              <a:rPr lang="en-US" sz="5400" dirty="0" err="1">
+                <a:solidFill>
+                  <a:schemeClr val="tx2"/>
+                </a:solidFill>
+              </a:rPr>
               <a:t>Config</a:t>
             </a:r>
             <a:r>
-              <a:rPr lang="en-US" sz="5400" dirty="0"/>
-              <a:t> Options – files (cont.)</a:t>
-            </a:r>
+              <a:rPr lang="en-US" sz="5400" dirty="0">
+                <a:solidFill>
+                  <a:schemeClr val="tx2"/>
+                </a:solidFill>
+              </a:rPr>
+              <a:t> Options – </a:t>
+            </a:r>
+            <a:r>
+              <a:rPr lang="en-US" sz="5400" dirty="0" smtClean="0">
+                <a:solidFill>
+                  <a:schemeClr val="tx2"/>
+                </a:solidFill>
+              </a:rPr>
+              <a:t>files</a:t>
+            </a:r>
+            <a:endParaRPr lang="en-US" sz="5400" dirty="0">
+              <a:solidFill>
+                <a:schemeClr val="tx2"/>
+              </a:solidFill>
+            </a:endParaRPr>
           </a:p>
         </p:txBody>
       </p:sp>
@@ -4870,26 +5396,50 @@
               <a:buNone/>
             </a:pPr>
             <a:r>
-              <a:rPr lang="en-US" sz="2400" dirty="0" smtClean="0">
-                <a:latin typeface="Consolas" panose="020B0609020204030204" pitchFamily="49" charset="0"/>
-                <a:cs typeface="Consolas" panose="020B0609020204030204" pitchFamily="49" charset="0"/>
-              </a:rPr>
-              <a:t>{pattern, watched: true, included: true, </a:t>
-            </a:r>
-            <a:r>
               <a:rPr lang="en-US" sz="2400" b="1" dirty="0" smtClean="0">
                 <a:latin typeface="Consolas" panose="020B0609020204030204" pitchFamily="49" charset="0"/>
                 <a:cs typeface="Consolas" panose="020B0609020204030204" pitchFamily="49" charset="0"/>
               </a:rPr>
-              <a:t>served: true</a:t>
-            </a:r>
-            <a:r>
-              <a:rPr lang="en-US" sz="2400" dirty="0" smtClean="0">
+              <a:t>{ pattern</a:t>
+            </a:r>
+            <a:r>
+              <a:rPr lang="en-US" sz="2400" b="1" dirty="0" smtClean="0">
                 <a:latin typeface="Consolas" panose="020B0609020204030204" pitchFamily="49" charset="0"/>
                 <a:cs typeface="Consolas" panose="020B0609020204030204" pitchFamily="49" charset="0"/>
               </a:rPr>
+              <a:t>, watched: true, included: true, </a:t>
+            </a:r>
+            <a:r>
+              <a:rPr lang="en-US" sz="2400" b="1" dirty="0" smtClean="0">
+                <a:solidFill>
+                  <a:srgbClr val="FF0000"/>
+                </a:solidFill>
+                <a:latin typeface="Consolas" panose="020B0609020204030204" pitchFamily="49" charset="0"/>
+                <a:cs typeface="Consolas" panose="020B0609020204030204" pitchFamily="49" charset="0"/>
+              </a:rPr>
+              <a:t>served: </a:t>
+            </a:r>
+            <a:r>
+              <a:rPr lang="en-US" sz="2400" b="1" dirty="0" smtClean="0">
+                <a:solidFill>
+                  <a:srgbClr val="FF0000"/>
+                </a:solidFill>
+                <a:latin typeface="Consolas" panose="020B0609020204030204" pitchFamily="49" charset="0"/>
+                <a:cs typeface="Consolas" panose="020B0609020204030204" pitchFamily="49" charset="0"/>
+              </a:rPr>
+              <a:t>true </a:t>
+            </a:r>
+            <a:r>
+              <a:rPr lang="en-US" sz="2400" b="1" dirty="0" smtClean="0">
+                <a:latin typeface="Consolas" panose="020B0609020204030204" pitchFamily="49" charset="0"/>
+                <a:cs typeface="Consolas" panose="020B0609020204030204" pitchFamily="49" charset="0"/>
+              </a:rPr>
               <a:t>}</a:t>
             </a:r>
+            <a:endParaRPr lang="en-US" sz="2400" b="1" dirty="0" smtClean="0">
+              <a:latin typeface="Consolas" panose="020B0609020204030204" pitchFamily="49" charset="0"/>
+              <a:cs typeface="Consolas" panose="020B0609020204030204" pitchFamily="49" charset="0"/>
+            </a:endParaRPr>
           </a:p>
           <a:p>
             <a:pPr marL="0" indent="0">
@@ -4899,20 +5449,36 @@
           </a:p>
           <a:p>
             <a:r>
-              <a:rPr lang="en-US" sz="3600" dirty="0"/>
+              <a:rPr lang="en-US" sz="3600" dirty="0">
+                <a:solidFill>
+                  <a:schemeClr val="tx2"/>
+                </a:solidFill>
+              </a:rPr>
               <a:t>K</a:t>
             </a:r>
             <a:r>
-              <a:rPr lang="en-US" sz="3600" dirty="0" smtClean="0"/>
+              <a:rPr lang="en-US" sz="3600" dirty="0" smtClean="0">
+                <a:solidFill>
+                  <a:schemeClr val="tx2"/>
+                </a:solidFill>
+              </a:rPr>
               <a:t>arma will serve the file with its webserver</a:t>
             </a:r>
           </a:p>
           <a:p>
-            <a:endParaRPr lang="en-US" sz="3600" dirty="0" smtClean="0"/>
-          </a:p>
-          <a:p>
-            <a:r>
-              <a:rPr lang="en-US" sz="3600" dirty="0" smtClean="0"/>
+            <a:endParaRPr lang="en-US" sz="3600" dirty="0" smtClean="0">
+              <a:solidFill>
+                <a:schemeClr val="tx2"/>
+              </a:solidFill>
+            </a:endParaRPr>
+          </a:p>
+          <a:p>
+            <a:r>
+              <a:rPr lang="en-US" sz="3600" dirty="0" smtClean="0">
+                <a:solidFill>
+                  <a:schemeClr val="tx2"/>
+                </a:solidFill>
+              </a:rPr>
               <a:t>Set to false when only including for watch option</a:t>
             </a:r>
           </a:p>
@@ -5193,7 +5759,7 @@
   <a:extraClrSchemeLst/>
   <a:extLst>
     <a:ext uri="{05A4C25C-085E-4340-85A3-A5531E510DB2}">
-      <thm15:themeFamily xmlns="" xmlns:thm15="http://schemas.microsoft.com/office/thememl/2012/main" name="Office Theme" id="{62F939B6-93AF-4DB8-9C6B-D6C7DFDC589F}" vid="{4A3C46E8-61CC-4603-A589-7422A47A8E4A}"/>
+      <thm15:themeFamily xmlns:thm15="http://schemas.microsoft.com/office/thememl/2012/main" xmlns="" name="Office Theme" id="{62F939B6-93AF-4DB8-9C6B-D6C7DFDC589F}" vid="{4A3C46E8-61CC-4603-A589-7422A47A8E4A}"/>
     </a:ext>
   </a:extLst>
 </a:theme>

</xml_diff>

<commit_message>
removing reference to commonjs
</commit_message>
<xml_diff>
--- a/karma-demo-slides.pptx
+++ b/karma-demo-slides.pptx
@@ -4,6 +4,9 @@
   <p:sldMasterIdLst>
     <p:sldMasterId id="2147483648" r:id="rId1"/>
   </p:sldMasterIdLst>
+  <p:handoutMasterIdLst>
+    <p:handoutMasterId r:id="rId17"/>
+  </p:handoutMasterIdLst>
   <p:sldIdLst>
     <p:sldId id="256" r:id="rId2"/>
     <p:sldId id="257" r:id="rId3"/>
@@ -22,7 +25,7 @@
     <p:sldId id="281" r:id="rId16"/>
   </p:sldIdLst>
   <p:sldSz cx="12192000" cy="6858000"/>
-  <p:notesSz cx="6858000" cy="9144000"/>
+  <p:notesSz cx="7023100" cy="9309100"/>
   <p:defaultTextStyle>
     <a:defPPr>
       <a:defRPr lang="en-US"/>
@@ -120,10 +123,175 @@
   </p:defaultTextStyle>
   <p:extLst>
     <p:ext uri="{EFAFB233-063F-42B5-8137-9DF3F51BA10A}">
-      <p15:sldGuideLst xmlns="" xmlns:p15="http://schemas.microsoft.com/office/powerpoint/2012/main"/>
+      <p15:sldGuideLst xmlns:p15="http://schemas.microsoft.com/office/powerpoint/2012/main" xmlns=""/>
     </p:ext>
   </p:extLst>
 </p:presentation>
+</file>
+
+<file path=ppt/handoutMasters/handoutMaster1.xml><?xml version="1.0" encoding="utf-8"?>
+<p:handoutMaster xmlns:a="http://schemas.openxmlformats.org/drawingml/2006/main" xmlns:r="http://schemas.openxmlformats.org/officeDocument/2006/relationships" xmlns:p="http://schemas.openxmlformats.org/presentationml/2006/main">
+  <p:cSld>
+    <p:bg>
+      <p:bgRef idx="1001">
+        <a:schemeClr val="bg1"/>
+      </p:bgRef>
+    </p:bg>
+    <p:spTree>
+      <p:nvGrpSpPr>
+        <p:cNvPr id="1" name=""/>
+        <p:cNvGrpSpPr/>
+        <p:nvPr/>
+      </p:nvGrpSpPr>
+      <p:grpSpPr>
+        <a:xfrm>
+          <a:off x="0" y="0"/>
+          <a:ext cx="0" cy="0"/>
+          <a:chOff x="0" y="0"/>
+          <a:chExt cx="0" cy="0"/>
+        </a:xfrm>
+      </p:grpSpPr>
+      <p:sp>
+        <p:nvSpPr>
+          <p:cNvPr id="2" name="Header Placeholder 1"/>
+          <p:cNvSpPr>
+            <a:spLocks noGrp="1"/>
+          </p:cNvSpPr>
+          <p:nvPr>
+            <p:ph type="hdr" sz="quarter"/>
+          </p:nvPr>
+        </p:nvSpPr>
+        <p:spPr>
+          <a:xfrm>
+            <a:off x="0" y="0"/>
+            <a:ext cx="3043343" cy="465455"/>
+          </a:xfrm>
+          <a:prstGeom prst="rect">
+            <a:avLst/>
+          </a:prstGeom>
+        </p:spPr>
+        <p:txBody>
+          <a:bodyPr vert="horz" lIns="93324" tIns="46662" rIns="93324" bIns="46662" rtlCol="0"/>
+          <a:lstStyle>
+            <a:lvl1pPr algn="l">
+              <a:defRPr sz="1200"/>
+            </a:lvl1pPr>
+          </a:lstStyle>
+          <a:p>
+            <a:endParaRPr lang="en-US"/>
+          </a:p>
+        </p:txBody>
+      </p:sp>
+      <p:sp>
+        <p:nvSpPr>
+          <p:cNvPr id="3" name="Date Placeholder 2"/>
+          <p:cNvSpPr>
+            <a:spLocks noGrp="1"/>
+          </p:cNvSpPr>
+          <p:nvPr>
+            <p:ph type="dt" sz="quarter" idx="1"/>
+          </p:nvPr>
+        </p:nvSpPr>
+        <p:spPr>
+          <a:xfrm>
+            <a:off x="3978132" y="0"/>
+            <a:ext cx="3043343" cy="465455"/>
+          </a:xfrm>
+          <a:prstGeom prst="rect">
+            <a:avLst/>
+          </a:prstGeom>
+        </p:spPr>
+        <p:txBody>
+          <a:bodyPr vert="horz" lIns="93324" tIns="46662" rIns="93324" bIns="46662" rtlCol="0"/>
+          <a:lstStyle>
+            <a:lvl1pPr algn="r">
+              <a:defRPr sz="1200"/>
+            </a:lvl1pPr>
+          </a:lstStyle>
+          <a:p>
+            <a:fld id="{ED07FACF-F1FC-4FED-809D-71DE4E4027F4}" type="datetimeFigureOut">
+              <a:rPr lang="en-US" smtClean="0"/>
+              <a:t>9/23/2014</a:t>
+            </a:fld>
+            <a:endParaRPr lang="en-US"/>
+          </a:p>
+        </p:txBody>
+      </p:sp>
+      <p:sp>
+        <p:nvSpPr>
+          <p:cNvPr id="4" name="Footer Placeholder 3"/>
+          <p:cNvSpPr>
+            <a:spLocks noGrp="1"/>
+          </p:cNvSpPr>
+          <p:nvPr>
+            <p:ph type="ftr" sz="quarter" idx="2"/>
+          </p:nvPr>
+        </p:nvSpPr>
+        <p:spPr>
+          <a:xfrm>
+            <a:off x="0" y="8842029"/>
+            <a:ext cx="3043343" cy="465455"/>
+          </a:xfrm>
+          <a:prstGeom prst="rect">
+            <a:avLst/>
+          </a:prstGeom>
+        </p:spPr>
+        <p:txBody>
+          <a:bodyPr vert="horz" lIns="93324" tIns="46662" rIns="93324" bIns="46662" rtlCol="0" anchor="b"/>
+          <a:lstStyle>
+            <a:lvl1pPr algn="l">
+              <a:defRPr sz="1200"/>
+            </a:lvl1pPr>
+          </a:lstStyle>
+          <a:p>
+            <a:endParaRPr lang="en-US"/>
+          </a:p>
+        </p:txBody>
+      </p:sp>
+      <p:sp>
+        <p:nvSpPr>
+          <p:cNvPr id="5" name="Slide Number Placeholder 4"/>
+          <p:cNvSpPr>
+            <a:spLocks noGrp="1"/>
+          </p:cNvSpPr>
+          <p:nvPr>
+            <p:ph type="sldNum" sz="quarter" idx="3"/>
+          </p:nvPr>
+        </p:nvSpPr>
+        <p:spPr>
+          <a:xfrm>
+            <a:off x="3978132" y="8842029"/>
+            <a:ext cx="3043343" cy="465455"/>
+          </a:xfrm>
+          <a:prstGeom prst="rect">
+            <a:avLst/>
+          </a:prstGeom>
+        </p:spPr>
+        <p:txBody>
+          <a:bodyPr vert="horz" lIns="93324" tIns="46662" rIns="93324" bIns="46662" rtlCol="0" anchor="b"/>
+          <a:lstStyle>
+            <a:lvl1pPr algn="r">
+              <a:defRPr sz="1200"/>
+            </a:lvl1pPr>
+          </a:lstStyle>
+          <a:p>
+            <a:fld id="{FC706860-0BB2-4970-91B9-CCAC7074E9C9}" type="slidenum">
+              <a:rPr lang="en-US" smtClean="0"/>
+              <a:t>‹#›</a:t>
+            </a:fld>
+            <a:endParaRPr lang="en-US"/>
+          </a:p>
+        </p:txBody>
+      </p:sp>
+    </p:spTree>
+    <p:extLst>
+      <p:ext uri="{BB962C8B-B14F-4D97-AF65-F5344CB8AC3E}">
+        <p14:creationId xmlns:p14="http://schemas.microsoft.com/office/powerpoint/2010/main" val="3808155639"/>
+      </p:ext>
+    </p:extLst>
+  </p:cSld>
+  <p:clrMap bg1="lt1" tx1="dk1" bg2="lt2" tx2="dk2" accent1="accent1" accent2="accent2" accent3="accent3" accent4="accent4" accent5="accent5" accent6="accent6" hlink="hlink" folHlink="folHlink"/>
+</p:handoutMaster>
 </file>
 
 <file path=ppt/slideLayouts/slideLayout1.xml><?xml version="1.0" encoding="utf-8"?>
@@ -3702,35 +3870,7 @@
                 <a:latin typeface="Consolas" panose="020B0609020204030204" pitchFamily="49" charset="0"/>
                 <a:cs typeface="Consolas" panose="020B0609020204030204" pitchFamily="49" charset="0"/>
               </a:rPr>
-              <a:t>: { type: ‘text-summary’ </a:t>
-            </a:r>
-            <a:r>
-              <a:rPr lang="en-US" b="1" dirty="0" smtClean="0">
-                <a:latin typeface="Consolas" panose="020B0609020204030204" pitchFamily="49" charset="0"/>
-                <a:cs typeface="Consolas" panose="020B0609020204030204" pitchFamily="49" charset="0"/>
-              </a:rPr>
-              <a:t>//‘</a:t>
-            </a:r>
-            <a:r>
-              <a:rPr lang="en-US" b="1" dirty="0" smtClean="0">
-                <a:latin typeface="Consolas" panose="020B0609020204030204" pitchFamily="49" charset="0"/>
-                <a:cs typeface="Consolas" panose="020B0609020204030204" pitchFamily="49" charset="0"/>
-              </a:rPr>
-              <a:t>html</a:t>
-            </a:r>
-            <a:r>
-              <a:rPr lang="en-US" b="1" dirty="0" smtClean="0">
-                <a:latin typeface="Consolas" panose="020B0609020204030204" pitchFamily="49" charset="0"/>
-                <a:cs typeface="Consolas" panose="020B0609020204030204" pitchFamily="49" charset="0"/>
-              </a:rPr>
-              <a:t>’ </a:t>
-            </a:r>
-            <a:r>
-              <a:rPr lang="en-US" b="1" dirty="0" smtClean="0">
-                <a:latin typeface="Consolas" panose="020B0609020204030204" pitchFamily="49" charset="0"/>
-                <a:cs typeface="Consolas" panose="020B0609020204030204" pitchFamily="49" charset="0"/>
-              </a:rPr>
-              <a:t>}</a:t>
+              <a:t>: { type: ‘text-summary’ //‘html’ }</a:t>
             </a:r>
           </a:p>
           <a:p>
@@ -4095,23 +4235,7 @@
                   <a:schemeClr val="tx2"/>
                 </a:solidFill>
               </a:rPr>
-              <a:t>Use with Grunt </a:t>
-            </a:r>
-            <a:r>
-              <a:rPr lang="en-US" sz="5400" dirty="0" smtClean="0">
-                <a:solidFill>
-                  <a:schemeClr val="tx2"/>
-                </a:solidFill>
-              </a:rPr>
-              <a:t>/ </a:t>
-            </a:r>
-            <a:r>
-              <a:rPr lang="en-US" sz="5400" dirty="0" smtClean="0">
-                <a:solidFill>
-                  <a:schemeClr val="tx2"/>
-                </a:solidFill>
-              </a:rPr>
-              <a:t>Gulp</a:t>
+              <a:t>Use with Grunt / Gulp</a:t>
             </a:r>
             <a:endParaRPr lang="en-US" sz="5400" dirty="0">
               <a:solidFill>
@@ -5779,23 +5903,7 @@
                   <a:schemeClr val="tx2"/>
                 </a:solidFill>
               </a:rPr>
-              <a:t>Karma will include </a:t>
-            </a:r>
-            <a:r>
-              <a:rPr lang="en-US" sz="3600" dirty="0" smtClean="0">
-                <a:solidFill>
-                  <a:schemeClr val="tx2"/>
-                </a:solidFill>
-              </a:rPr>
-              <a:t>files </a:t>
-            </a:r>
-            <a:r>
-              <a:rPr lang="en-US" sz="3600" dirty="0" smtClean="0">
-                <a:solidFill>
-                  <a:schemeClr val="tx2"/>
-                </a:solidFill>
-              </a:rPr>
-              <a:t>in a &lt;script&gt; tag</a:t>
+              <a:t>Karma will include files in a &lt;script&gt; tag</a:t>
             </a:r>
           </a:p>
           <a:p>
@@ -5823,28 +5931,12 @@
               <a:t>et to false if you’re using </a:t>
             </a:r>
             <a:r>
-              <a:rPr lang="en-US" sz="3600" dirty="0" err="1" smtClean="0">
+              <a:rPr lang="en-US" sz="3600" smtClean="0">
                 <a:solidFill>
                   <a:schemeClr val="tx2"/>
                 </a:solidFill>
               </a:rPr>
               <a:t>RequireJS</a:t>
-            </a:r>
-            <a:r>
-              <a:rPr lang="en-US" sz="3600" dirty="0" smtClean="0">
-                <a:solidFill>
-                  <a:schemeClr val="tx2"/>
-                </a:solidFill>
-              </a:rPr>
-              <a:t> or </a:t>
-            </a:r>
-            <a:r>
-              <a:rPr lang="en-US" sz="3600" dirty="0" err="1" smtClean="0">
-                <a:solidFill>
-                  <a:schemeClr val="tx2"/>
-                </a:solidFill>
-              </a:rPr>
-              <a:t>CommonJS</a:t>
             </a:r>
             <a:endParaRPr lang="en-US" sz="3600" dirty="0" smtClean="0">
               <a:solidFill>
@@ -6065,23 +6157,7 @@
                   <a:schemeClr val="tx2"/>
                 </a:solidFill>
               </a:rPr>
-              <a:t>arma will serve the </a:t>
-            </a:r>
-            <a:r>
-              <a:rPr lang="en-US" sz="3600" dirty="0" smtClean="0">
-                <a:solidFill>
-                  <a:schemeClr val="tx2"/>
-                </a:solidFill>
-              </a:rPr>
-              <a:t>files </a:t>
-            </a:r>
-            <a:r>
-              <a:rPr lang="en-US" sz="3600" dirty="0" smtClean="0">
-                <a:solidFill>
-                  <a:schemeClr val="tx2"/>
-                </a:solidFill>
-              </a:rPr>
-              <a:t>with its webserver</a:t>
+              <a:t>arma will serve the files with its webserver</a:t>
             </a:r>
           </a:p>
           <a:p>
@@ -6434,8 +6510,293 @@
   <a:extraClrSchemeLst/>
   <a:extLst>
     <a:ext uri="{05A4C25C-085E-4340-85A3-A5531E510DB2}">
-      <thm15:themeFamily xmlns="" xmlns:thm15="http://schemas.microsoft.com/office/thememl/2012/main" name="Office Theme" id="{62F939B6-93AF-4DB8-9C6B-D6C7DFDC589F}" vid="{4A3C46E8-61CC-4603-A589-7422A47A8E4A}"/>
+      <thm15:themeFamily xmlns:thm15="http://schemas.microsoft.com/office/thememl/2012/main" xmlns="" name="Office Theme" id="{62F939B6-93AF-4DB8-9C6B-D6C7DFDC589F}" vid="{4A3C46E8-61CC-4603-A589-7422A47A8E4A}"/>
     </a:ext>
   </a:extLst>
 </a:theme>
+</file>
+
+<file path=ppt/theme/theme2.xml><?xml version="1.0" encoding="utf-8"?>
+<a:theme xmlns:a="http://schemas.openxmlformats.org/drawingml/2006/main" name="Office Theme">
+  <a:themeElements>
+    <a:clrScheme name="Office">
+      <a:dk1>
+        <a:sysClr val="windowText" lastClr="000000"/>
+      </a:dk1>
+      <a:lt1>
+        <a:sysClr val="window" lastClr="FFFFFF"/>
+      </a:lt1>
+      <a:dk2>
+        <a:srgbClr val="1F497D"/>
+      </a:dk2>
+      <a:lt2>
+        <a:srgbClr val="EEECE1"/>
+      </a:lt2>
+      <a:accent1>
+        <a:srgbClr val="4F81BD"/>
+      </a:accent1>
+      <a:accent2>
+        <a:srgbClr val="C0504D"/>
+      </a:accent2>
+      <a:accent3>
+        <a:srgbClr val="9BBB59"/>
+      </a:accent3>
+      <a:accent4>
+        <a:srgbClr val="8064A2"/>
+      </a:accent4>
+      <a:accent5>
+        <a:srgbClr val="4BACC6"/>
+      </a:accent5>
+      <a:accent6>
+        <a:srgbClr val="F79646"/>
+      </a:accent6>
+      <a:hlink>
+        <a:srgbClr val="0000FF"/>
+      </a:hlink>
+      <a:folHlink>
+        <a:srgbClr val="800080"/>
+      </a:folHlink>
+    </a:clrScheme>
+    <a:fontScheme name="Office">
+      <a:majorFont>
+        <a:latin typeface="Calibri"/>
+        <a:ea typeface=""/>
+        <a:cs typeface=""/>
+        <a:font script="Jpan" typeface="ＭＳ Ｐゴシック"/>
+        <a:font script="Hang" typeface="맑은 고딕"/>
+        <a:font script="Hans" typeface="宋体"/>
+        <a:font script="Hant" typeface="新細明體"/>
+        <a:font script="Arab" typeface="Times New Roman"/>
+        <a:font script="Hebr" typeface="Times New Roman"/>
+        <a:font script="Thai" typeface="Angsana New"/>
+        <a:font script="Ethi" typeface="Nyala"/>
+        <a:font script="Beng" typeface="Vrinda"/>
+        <a:font script="Gujr" typeface="Shruti"/>
+        <a:font script="Khmr" typeface="MoolBoran"/>
+        <a:font script="Knda" typeface="Tunga"/>
+        <a:font script="Guru" typeface="Raavi"/>
+        <a:font script="Cans" typeface="Euphemia"/>
+        <a:font script="Cher" typeface="Plantagenet Cherokee"/>
+        <a:font script="Yiii" typeface="Microsoft Yi Baiti"/>
+        <a:font script="Tibt" typeface="Microsoft Himalaya"/>
+        <a:font script="Thaa" typeface="MV Boli"/>
+        <a:font script="Deva" typeface="Mangal"/>
+        <a:font script="Telu" typeface="Gautami"/>
+        <a:font script="Taml" typeface="Latha"/>
+        <a:font script="Syrc" typeface="Estrangelo Edessa"/>
+        <a:font script="Orya" typeface="Kalinga"/>
+        <a:font script="Mlym" typeface="Kartika"/>
+        <a:font script="Laoo" typeface="DokChampa"/>
+        <a:font script="Sinh" typeface="Iskoola Pota"/>
+        <a:font script="Mong" typeface="Mongolian Baiti"/>
+        <a:font script="Viet" typeface="Times New Roman"/>
+        <a:font script="Uigh" typeface="Microsoft Uighur"/>
+        <a:font script="Geor" typeface="Sylfaen"/>
+      </a:majorFont>
+      <a:minorFont>
+        <a:latin typeface="Calibri"/>
+        <a:ea typeface=""/>
+        <a:cs typeface=""/>
+        <a:font script="Jpan" typeface="ＭＳ Ｐゴシック"/>
+        <a:font script="Hang" typeface="맑은 고딕"/>
+        <a:font script="Hans" typeface="宋体"/>
+        <a:font script="Hant" typeface="新細明體"/>
+        <a:font script="Arab" typeface="Arial"/>
+        <a:font script="Hebr" typeface="Arial"/>
+        <a:font script="Thai" typeface="Cordia New"/>
+        <a:font script="Ethi" typeface="Nyala"/>
+        <a:font script="Beng" typeface="Vrinda"/>
+        <a:font script="Gujr" typeface="Shruti"/>
+        <a:font script="Khmr" typeface="DaunPenh"/>
+        <a:font script="Knda" typeface="Tunga"/>
+        <a:font script="Guru" typeface="Raavi"/>
+        <a:font script="Cans" typeface="Euphemia"/>
+        <a:font script="Cher" typeface="Plantagenet Cherokee"/>
+        <a:font script="Yiii" typeface="Microsoft Yi Baiti"/>
+        <a:font script="Tibt" typeface="Microsoft Himalaya"/>
+        <a:font script="Thaa" typeface="MV Boli"/>
+        <a:font script="Deva" typeface="Mangal"/>
+        <a:font script="Telu" typeface="Gautami"/>
+        <a:font script="Taml" typeface="Latha"/>
+        <a:font script="Syrc" typeface="Estrangelo Edessa"/>
+        <a:font script="Orya" typeface="Kalinga"/>
+        <a:font script="Mlym" typeface="Kartika"/>
+        <a:font script="Laoo" typeface="DokChampa"/>
+        <a:font script="Sinh" typeface="Iskoola Pota"/>
+        <a:font script="Mong" typeface="Mongolian Baiti"/>
+        <a:font script="Viet" typeface="Arial"/>
+        <a:font script="Uigh" typeface="Microsoft Uighur"/>
+        <a:font script="Geor" typeface="Sylfaen"/>
+      </a:minorFont>
+    </a:fontScheme>
+    <a:fmtScheme name="Office">
+      <a:fillStyleLst>
+        <a:solidFill>
+          <a:schemeClr val="phClr"/>
+        </a:solidFill>
+        <a:gradFill rotWithShape="1">
+          <a:gsLst>
+            <a:gs pos="0">
+              <a:schemeClr val="phClr">
+                <a:tint val="50000"/>
+                <a:satMod val="300000"/>
+              </a:schemeClr>
+            </a:gs>
+            <a:gs pos="35000">
+              <a:schemeClr val="phClr">
+                <a:tint val="37000"/>
+                <a:satMod val="300000"/>
+              </a:schemeClr>
+            </a:gs>
+            <a:gs pos="100000">
+              <a:schemeClr val="phClr">
+                <a:tint val="15000"/>
+                <a:satMod val="350000"/>
+              </a:schemeClr>
+            </a:gs>
+          </a:gsLst>
+          <a:lin ang="16200000" scaled="1"/>
+        </a:gradFill>
+        <a:gradFill rotWithShape="1">
+          <a:gsLst>
+            <a:gs pos="0">
+              <a:schemeClr val="phClr">
+                <a:shade val="51000"/>
+                <a:satMod val="130000"/>
+              </a:schemeClr>
+            </a:gs>
+            <a:gs pos="80000">
+              <a:schemeClr val="phClr">
+                <a:shade val="93000"/>
+                <a:satMod val="130000"/>
+              </a:schemeClr>
+            </a:gs>
+            <a:gs pos="100000">
+              <a:schemeClr val="phClr">
+                <a:shade val="94000"/>
+                <a:satMod val="135000"/>
+              </a:schemeClr>
+            </a:gs>
+          </a:gsLst>
+          <a:lin ang="16200000" scaled="0"/>
+        </a:gradFill>
+      </a:fillStyleLst>
+      <a:lnStyleLst>
+        <a:ln w="9525" cap="flat" cmpd="sng" algn="ctr">
+          <a:solidFill>
+            <a:schemeClr val="phClr">
+              <a:shade val="95000"/>
+              <a:satMod val="105000"/>
+            </a:schemeClr>
+          </a:solidFill>
+          <a:prstDash val="solid"/>
+        </a:ln>
+        <a:ln w="25400" cap="flat" cmpd="sng" algn="ctr">
+          <a:solidFill>
+            <a:schemeClr val="phClr"/>
+          </a:solidFill>
+          <a:prstDash val="solid"/>
+        </a:ln>
+        <a:ln w="38100" cap="flat" cmpd="sng" algn="ctr">
+          <a:solidFill>
+            <a:schemeClr val="phClr"/>
+          </a:solidFill>
+          <a:prstDash val="solid"/>
+        </a:ln>
+      </a:lnStyleLst>
+      <a:effectStyleLst>
+        <a:effectStyle>
+          <a:effectLst>
+            <a:outerShdw blurRad="40000" dist="20000" dir="5400000" rotWithShape="0">
+              <a:srgbClr val="000000">
+                <a:alpha val="38000"/>
+              </a:srgbClr>
+            </a:outerShdw>
+          </a:effectLst>
+        </a:effectStyle>
+        <a:effectStyle>
+          <a:effectLst>
+            <a:outerShdw blurRad="40000" dist="23000" dir="5400000" rotWithShape="0">
+              <a:srgbClr val="000000">
+                <a:alpha val="35000"/>
+              </a:srgbClr>
+            </a:outerShdw>
+          </a:effectLst>
+        </a:effectStyle>
+        <a:effectStyle>
+          <a:effectLst>
+            <a:outerShdw blurRad="40000" dist="23000" dir="5400000" rotWithShape="0">
+              <a:srgbClr val="000000">
+                <a:alpha val="35000"/>
+              </a:srgbClr>
+            </a:outerShdw>
+          </a:effectLst>
+          <a:scene3d>
+            <a:camera prst="orthographicFront">
+              <a:rot lat="0" lon="0" rev="0"/>
+            </a:camera>
+            <a:lightRig rig="threePt" dir="t">
+              <a:rot lat="0" lon="0" rev="1200000"/>
+            </a:lightRig>
+          </a:scene3d>
+          <a:sp3d>
+            <a:bevelT w="63500" h="25400"/>
+          </a:sp3d>
+        </a:effectStyle>
+      </a:effectStyleLst>
+      <a:bgFillStyleLst>
+        <a:solidFill>
+          <a:schemeClr val="phClr"/>
+        </a:solidFill>
+        <a:gradFill rotWithShape="1">
+          <a:gsLst>
+            <a:gs pos="0">
+              <a:schemeClr val="phClr">
+                <a:tint val="40000"/>
+                <a:satMod val="350000"/>
+              </a:schemeClr>
+            </a:gs>
+            <a:gs pos="40000">
+              <a:schemeClr val="phClr">
+                <a:tint val="45000"/>
+                <a:shade val="99000"/>
+                <a:satMod val="350000"/>
+              </a:schemeClr>
+            </a:gs>
+            <a:gs pos="100000">
+              <a:schemeClr val="phClr">
+                <a:shade val="20000"/>
+                <a:satMod val="255000"/>
+              </a:schemeClr>
+            </a:gs>
+          </a:gsLst>
+          <a:path path="circle">
+            <a:fillToRect l="50000" t="-80000" r="50000" b="180000"/>
+          </a:path>
+        </a:gradFill>
+        <a:gradFill rotWithShape="1">
+          <a:gsLst>
+            <a:gs pos="0">
+              <a:schemeClr val="phClr">
+                <a:tint val="80000"/>
+                <a:satMod val="300000"/>
+              </a:schemeClr>
+            </a:gs>
+            <a:gs pos="100000">
+              <a:schemeClr val="phClr">
+                <a:shade val="30000"/>
+                <a:satMod val="200000"/>
+              </a:schemeClr>
+            </a:gs>
+          </a:gsLst>
+          <a:path path="circle">
+            <a:fillToRect l="50000" t="50000" r="50000" b="50000"/>
+          </a:path>
+        </a:gradFill>
+      </a:bgFillStyleLst>
+    </a:fmtScheme>
+  </a:themeElements>
+  <a:objectDefaults/>
+  <a:extraClrSchemeLst/>
+</a:theme>
 </file>
</xml_diff>